<commit_message>
Update de SQLite + Maui Blazor
</commit_message>
<xml_diff>
--- a/13) .Net MAUI/SQLite MAUI Blazor Híbrida (2024).pptx
+++ b/13) .Net MAUI/SQLite MAUI Blazor Híbrida (2024).pptx
@@ -5,34 +5,14 @@
     <p:sldMasterId id="2147483648" r:id="rId1"/>
   </p:sldMasterIdLst>
   <p:notesMasterIdLst>
-    <p:notesMasterId r:id="rId27"/>
+    <p:notesMasterId r:id="rId7"/>
   </p:notesMasterIdLst>
   <p:sldIdLst>
     <p:sldId id="259" r:id="rId2"/>
     <p:sldId id="266" r:id="rId3"/>
-    <p:sldId id="271" r:id="rId4"/>
-    <p:sldId id="267" r:id="rId5"/>
-    <p:sldId id="268" r:id="rId6"/>
-    <p:sldId id="269" r:id="rId7"/>
-    <p:sldId id="270" r:id="rId8"/>
-    <p:sldId id="272" r:id="rId9"/>
-    <p:sldId id="273" r:id="rId10"/>
-    <p:sldId id="274" r:id="rId11"/>
-    <p:sldId id="276" r:id="rId12"/>
-    <p:sldId id="275" r:id="rId13"/>
-    <p:sldId id="277" r:id="rId14"/>
-    <p:sldId id="278" r:id="rId15"/>
-    <p:sldId id="279" r:id="rId16"/>
-    <p:sldId id="280" r:id="rId17"/>
-    <p:sldId id="281" r:id="rId18"/>
-    <p:sldId id="282" r:id="rId19"/>
-    <p:sldId id="283" r:id="rId20"/>
-    <p:sldId id="284" r:id="rId21"/>
-    <p:sldId id="286" r:id="rId22"/>
-    <p:sldId id="285" r:id="rId23"/>
-    <p:sldId id="287" r:id="rId24"/>
-    <p:sldId id="288" r:id="rId25"/>
-    <p:sldId id="265" r:id="rId26"/>
+    <p:sldId id="267" r:id="rId4"/>
+    <p:sldId id="269" r:id="rId5"/>
+    <p:sldId id="265" r:id="rId6"/>
   </p:sldIdLst>
   <p:sldSz cx="24384000" cy="13716000"/>
   <p:notesSz cx="6858000" cy="9144000"/>
@@ -1012,7 +992,7 @@
           </a:ln>
           <a:extLst>
             <a:ext uri="{C572A759-6A51-4108-AA02-DFA0A04FC94B}">
-              <ma14:wrappingTextBoxFlag xmlns="" xmlns:ma14="http://schemas.microsoft.com/office/mac/drawingml/2011/main" val="1"/>
+              <ma14:wrappingTextBoxFlag xmlns:ma14="http://schemas.microsoft.com/office/mac/drawingml/2011/main" xmlns="" val="1"/>
             </a:ext>
           </a:extLst>
         </p:spPr>
@@ -1051,7 +1031,7 @@
           </a:ln>
           <a:extLst>
             <a:ext uri="{C572A759-6A51-4108-AA02-DFA0A04FC94B}">
-              <ma14:wrappingTextBoxFlag xmlns="" xmlns:ma14="http://schemas.microsoft.com/office/mac/drawingml/2011/main" val="1"/>
+              <ma14:wrappingTextBoxFlag xmlns:ma14="http://schemas.microsoft.com/office/mac/drawingml/2011/main" xmlns="" val="1"/>
             </a:ext>
           </a:extLst>
         </p:spPr>
@@ -2076,7 +2056,7 @@
         </p:spPr>
         <p:txBody>
           <a:bodyPr>
-            <a:normAutofit fontScale="85000" lnSpcReduction="10000"/>
+            <a:normAutofit fontScale="70000" lnSpcReduction="20000"/>
           </a:bodyPr>
           <a:lstStyle/>
           <a:p>
@@ -2087,7 +2067,7 @@
                   <a:schemeClr val="bg1"/>
                 </a:solidFill>
               </a:rPr>
-              <a:t>Primera App MAUI </a:t>
+              <a:t>SQLite en el Todo-App MAUI </a:t>
             </a:r>
             <a:r>
               <a:rPr lang="es-CR" sz="11800" dirty="0" err="1">
@@ -2140,7 +2120,7 @@
           </a:ln>
           <a:extLst>
             <a:ext uri="{C572A759-6A51-4108-AA02-DFA0A04FC94B}">
-              <ma14:wrappingTextBoxFlag xmlns="" xmlns:ma14="http://schemas.microsoft.com/office/mac/drawingml/2011/main" val="1"/>
+              <ma14:wrappingTextBoxFlag xmlns:ma14="http://schemas.microsoft.com/office/mac/drawingml/2011/main" xmlns="" val="1"/>
             </a:ext>
           </a:extLst>
         </p:spPr>
@@ -2430,7 +2410,7 @@
                   <a:schemeClr val="bg1"/>
                 </a:solidFill>
               </a:rPr>
-              <a:t>1) </a:t>
+              <a:t>4) </a:t>
             </a:r>
             <a:r>
               <a:rPr lang="es-CR" sz="11800" dirty="0" err="1">
@@ -2438,7 +2418,7 @@
                   <a:schemeClr val="bg1"/>
                 </a:solidFill>
               </a:rPr>
-              <a:t>PrimerAppMAUIBlazor</a:t>
+              <a:t>TodoSQLiteMAUIBlazor</a:t>
             </a:r>
             <a:endParaRPr lang="es-CR" sz="11800" dirty="0">
               <a:solidFill>
@@ -2449,1148 +2429,6 @@
         </p:txBody>
       </p:sp>
     </p:spTree>
-  </p:cSld>
-  <p:clrMapOvr>
-    <a:masterClrMapping/>
-  </p:clrMapOvr>
-  <p:transition spd="med"/>
-</p:sld>
-</file>
-
-<file path=ppt/slides/slide10.xml><?xml version="1.0" encoding="utf-8"?>
-<p:sld xmlns:a="http://schemas.openxmlformats.org/drawingml/2006/main" xmlns:r="http://schemas.openxmlformats.org/officeDocument/2006/relationships" xmlns:p="http://schemas.openxmlformats.org/presentationml/2006/main">
-  <p:cSld>
-    <p:spTree>
-      <p:nvGrpSpPr>
-        <p:cNvPr id="1" name=""/>
-        <p:cNvGrpSpPr/>
-        <p:nvPr/>
-      </p:nvGrpSpPr>
-      <p:grpSpPr>
-        <a:xfrm>
-          <a:off x="0" y="0"/>
-          <a:ext cx="0" cy="0"/>
-          <a:chOff x="0" y="0"/>
-          <a:chExt cx="0" cy="0"/>
-        </a:xfrm>
-      </p:grpSpPr>
-      <p:sp>
-        <p:nvSpPr>
-          <p:cNvPr id="3" name="Marcador de texto 2">
-            <a:extLst>
-              <a:ext uri="{FF2B5EF4-FFF2-40B4-BE49-F238E27FC236}">
-                <a16:creationId xmlns:a16="http://schemas.microsoft.com/office/drawing/2014/main" id="{11D6998A-AC69-6E81-D91B-8F86FA56C891}"/>
-              </a:ext>
-            </a:extLst>
-          </p:cNvPr>
-          <p:cNvSpPr>
-            <a:spLocks noGrp="1"/>
-          </p:cNvSpPr>
-          <p:nvPr>
-            <p:ph type="body" sz="quarter" idx="14"/>
-          </p:nvPr>
-        </p:nvSpPr>
-        <p:spPr>
-          <a:xfrm>
-            <a:off x="715619" y="749491"/>
-            <a:ext cx="19262034" cy="1417239"/>
-          </a:xfrm>
-        </p:spPr>
-        <p:txBody>
-          <a:bodyPr>
-            <a:normAutofit/>
-          </a:bodyPr>
-          <a:lstStyle/>
-          <a:p>
-            <a:r>
-              <a:rPr lang="es-CR" sz="7200" dirty="0">
-                <a:effectLst>
-                  <a:outerShdw blurRad="38100" dist="38100" dir="2700000" algn="tl">
-                    <a:srgbClr val="000000">
-                      <a:alpha val="43137"/>
-                    </a:srgbClr>
-                  </a:outerShdw>
-                </a:effectLst>
-              </a:rPr>
-              <a:t>Todas las plataformas apuntan a la misma clase #2</a:t>
-            </a:r>
-          </a:p>
-        </p:txBody>
-      </p:sp>
-      <p:pic>
-        <p:nvPicPr>
-          <p:cNvPr id="4" name="Imagen 3">
-            <a:extLst>
-              <a:ext uri="{FF2B5EF4-FFF2-40B4-BE49-F238E27FC236}">
-                <a16:creationId xmlns:a16="http://schemas.microsoft.com/office/drawing/2014/main" id="{46F3C6CE-24CC-B309-0C86-A850627ECEE6}"/>
-              </a:ext>
-            </a:extLst>
-          </p:cNvPr>
-          <p:cNvPicPr>
-            <a:picLocks noChangeAspect="1"/>
-          </p:cNvPicPr>
-          <p:nvPr/>
-        </p:nvPicPr>
-        <p:blipFill rotWithShape="1">
-          <a:blip r:embed="rId2"/>
-          <a:srcRect t="11902"/>
-          <a:stretch/>
-        </p:blipFill>
-        <p:spPr>
-          <a:xfrm>
-            <a:off x="1745164" y="2579402"/>
-            <a:ext cx="19869293" cy="10387107"/>
-          </a:xfrm>
-          <a:prstGeom prst="rect">
-            <a:avLst/>
-          </a:prstGeom>
-        </p:spPr>
-      </p:pic>
-    </p:spTree>
-    <p:extLst>
-      <p:ext uri="{BB962C8B-B14F-4D97-AF65-F5344CB8AC3E}">
-        <p14:creationId xmlns:p14="http://schemas.microsoft.com/office/powerpoint/2010/main" val="221895487"/>
-      </p:ext>
-    </p:extLst>
-  </p:cSld>
-  <p:clrMapOvr>
-    <a:masterClrMapping/>
-  </p:clrMapOvr>
-  <p:transition spd="med"/>
-</p:sld>
-</file>
-
-<file path=ppt/slides/slide11.xml><?xml version="1.0" encoding="utf-8"?>
-<p:sld xmlns:a="http://schemas.openxmlformats.org/drawingml/2006/main" xmlns:r="http://schemas.openxmlformats.org/officeDocument/2006/relationships" xmlns:p="http://schemas.openxmlformats.org/presentationml/2006/main">
-  <p:cSld>
-    <p:spTree>
-      <p:nvGrpSpPr>
-        <p:cNvPr id="1" name=""/>
-        <p:cNvGrpSpPr/>
-        <p:nvPr/>
-      </p:nvGrpSpPr>
-      <p:grpSpPr>
-        <a:xfrm>
-          <a:off x="0" y="0"/>
-          <a:ext cx="0" cy="0"/>
-          <a:chOff x="0" y="0"/>
-          <a:chExt cx="0" cy="0"/>
-        </a:xfrm>
-      </p:grpSpPr>
-      <p:sp>
-        <p:nvSpPr>
-          <p:cNvPr id="3" name="Marcador de texto 2">
-            <a:extLst>
-              <a:ext uri="{FF2B5EF4-FFF2-40B4-BE49-F238E27FC236}">
-                <a16:creationId xmlns:a16="http://schemas.microsoft.com/office/drawing/2014/main" id="{2716B7AD-09D5-2A8B-E65D-55F030BD46B8}"/>
-              </a:ext>
-            </a:extLst>
-          </p:cNvPr>
-          <p:cNvSpPr>
-            <a:spLocks noGrp="1"/>
-          </p:cNvSpPr>
-          <p:nvPr>
-            <p:ph type="body" sz="quarter" idx="14"/>
-          </p:nvPr>
-        </p:nvSpPr>
-        <p:spPr>
-          <a:xfrm>
-            <a:off x="2953808" y="5213442"/>
-            <a:ext cx="18476383" cy="2203252"/>
-          </a:xfrm>
-        </p:spPr>
-        <p:txBody>
-          <a:bodyPr>
-            <a:normAutofit fontScale="70000" lnSpcReduction="20000"/>
-          </a:bodyPr>
-          <a:lstStyle/>
-          <a:p>
-            <a:pPr algn="ctr"/>
-            <a:r>
-              <a:rPr lang="es-CR" dirty="0">
-                <a:effectLst>
-                  <a:outerShdw blurRad="38100" dist="38100" dir="2700000" algn="tl">
-                    <a:srgbClr val="000000">
-                      <a:alpha val="43137"/>
-                    </a:srgbClr>
-                  </a:outerShdw>
-                </a:effectLst>
-              </a:rPr>
-              <a:t>Probamos hacer algunos cambios</a:t>
-            </a:r>
-          </a:p>
-          <a:p>
-            <a:pPr algn="ctr"/>
-            <a:r>
-              <a:rPr lang="es-CR" dirty="0">
-                <a:effectLst>
-                  <a:outerShdw blurRad="38100" dist="38100" dir="2700000" algn="tl">
-                    <a:srgbClr val="000000">
-                      <a:alpha val="43137"/>
-                    </a:srgbClr>
-                  </a:outerShdw>
-                </a:effectLst>
-              </a:rPr>
-              <a:t>para hacer nuestro primer hola mundo</a:t>
-            </a:r>
-          </a:p>
-        </p:txBody>
-      </p:sp>
-    </p:spTree>
-    <p:extLst>
-      <p:ext uri="{BB962C8B-B14F-4D97-AF65-F5344CB8AC3E}">
-        <p14:creationId xmlns:p14="http://schemas.microsoft.com/office/powerpoint/2010/main" val="3919143286"/>
-      </p:ext>
-    </p:extLst>
-  </p:cSld>
-  <p:clrMapOvr>
-    <a:masterClrMapping/>
-  </p:clrMapOvr>
-  <p:transition spd="med"/>
-</p:sld>
-</file>
-
-<file path=ppt/slides/slide12.xml><?xml version="1.0" encoding="utf-8"?>
-<p:sld xmlns:a="http://schemas.openxmlformats.org/drawingml/2006/main" xmlns:r="http://schemas.openxmlformats.org/officeDocument/2006/relationships" xmlns:p="http://schemas.openxmlformats.org/presentationml/2006/main">
-  <p:cSld>
-    <p:spTree>
-      <p:nvGrpSpPr>
-        <p:cNvPr id="1" name=""/>
-        <p:cNvGrpSpPr/>
-        <p:nvPr/>
-      </p:nvGrpSpPr>
-      <p:grpSpPr>
-        <a:xfrm>
-          <a:off x="0" y="0"/>
-          <a:ext cx="0" cy="0"/>
-          <a:chOff x="0" y="0"/>
-          <a:chExt cx="0" cy="0"/>
-        </a:xfrm>
-      </p:grpSpPr>
-      <p:sp>
-        <p:nvSpPr>
-          <p:cNvPr id="3" name="Marcador de texto 2">
-            <a:extLst>
-              <a:ext uri="{FF2B5EF4-FFF2-40B4-BE49-F238E27FC236}">
-                <a16:creationId xmlns:a16="http://schemas.microsoft.com/office/drawing/2014/main" id="{9DCC41F9-537F-A0AD-1357-054C0AEA22A5}"/>
-              </a:ext>
-            </a:extLst>
-          </p:cNvPr>
-          <p:cNvSpPr>
-            <a:spLocks noGrp="1"/>
-          </p:cNvSpPr>
-          <p:nvPr>
-            <p:ph type="body" sz="quarter" idx="14"/>
-          </p:nvPr>
-        </p:nvSpPr>
-        <p:spPr>
-          <a:xfrm>
-            <a:off x="769362" y="720955"/>
-            <a:ext cx="18476383" cy="2203252"/>
-          </a:xfrm>
-        </p:spPr>
-        <p:txBody>
-          <a:bodyPr>
-            <a:normAutofit fontScale="70000" lnSpcReduction="20000"/>
-          </a:bodyPr>
-          <a:lstStyle/>
-          <a:p>
-            <a:r>
-              <a:rPr lang="es-CR" dirty="0">
-                <a:effectLst>
-                  <a:outerShdw blurRad="38100" dist="38100" dir="2700000" algn="tl">
-                    <a:srgbClr val="000000">
-                      <a:alpha val="43137"/>
-                    </a:srgbClr>
-                  </a:outerShdw>
-                </a:effectLst>
-              </a:rPr>
-              <a:t>Modificamos la página Home </a:t>
-            </a:r>
-          </a:p>
-          <a:p>
-            <a:r>
-              <a:rPr lang="es-CR" dirty="0">
-                <a:effectLst>
-                  <a:outerShdw blurRad="38100" dist="38100" dir="2700000" algn="tl">
-                    <a:srgbClr val="000000">
-                      <a:alpha val="43137"/>
-                    </a:srgbClr>
-                  </a:outerShdw>
-                </a:effectLst>
-              </a:rPr>
-              <a:t>y agregamos un Hola Mundo</a:t>
-            </a:r>
-          </a:p>
-        </p:txBody>
-      </p:sp>
-      <p:pic>
-        <p:nvPicPr>
-          <p:cNvPr id="8" name="Imagen 7">
-            <a:extLst>
-              <a:ext uri="{FF2B5EF4-FFF2-40B4-BE49-F238E27FC236}">
-                <a16:creationId xmlns:a16="http://schemas.microsoft.com/office/drawing/2014/main" id="{5FE93DD8-781E-E8E2-343B-B80401A81473}"/>
-              </a:ext>
-            </a:extLst>
-          </p:cNvPr>
-          <p:cNvPicPr>
-            <a:picLocks noChangeAspect="1"/>
-          </p:cNvPicPr>
-          <p:nvPr/>
-        </p:nvPicPr>
-        <p:blipFill>
-          <a:blip r:embed="rId2"/>
-          <a:stretch>
-            <a:fillRect/>
-          </a:stretch>
-        </p:blipFill>
-        <p:spPr>
-          <a:xfrm>
-            <a:off x="324777" y="4533812"/>
-            <a:ext cx="21070759" cy="8894188"/>
-          </a:xfrm>
-          <a:prstGeom prst="rect">
-            <a:avLst/>
-          </a:prstGeom>
-        </p:spPr>
-      </p:pic>
-      <p:pic>
-        <p:nvPicPr>
-          <p:cNvPr id="5" name="Imagen 4">
-            <a:extLst>
-              <a:ext uri="{FF2B5EF4-FFF2-40B4-BE49-F238E27FC236}">
-                <a16:creationId xmlns:a16="http://schemas.microsoft.com/office/drawing/2014/main" id="{84EB4397-5F5E-0480-0CCC-0DE030F61881}"/>
-              </a:ext>
-            </a:extLst>
-          </p:cNvPr>
-          <p:cNvPicPr>
-            <a:picLocks noChangeAspect="1"/>
-          </p:cNvPicPr>
-          <p:nvPr/>
-        </p:nvPicPr>
-        <p:blipFill rotWithShape="1">
-          <a:blip r:embed="rId3"/>
-          <a:srcRect l="81615" b="17667"/>
-          <a:stretch/>
-        </p:blipFill>
-        <p:spPr>
-          <a:xfrm>
-            <a:off x="18955991" y="0"/>
-            <a:ext cx="5428009" cy="7103223"/>
-          </a:xfrm>
-          <a:prstGeom prst="rect">
-            <a:avLst/>
-          </a:prstGeom>
-        </p:spPr>
-      </p:pic>
-    </p:spTree>
-    <p:extLst>
-      <p:ext uri="{BB962C8B-B14F-4D97-AF65-F5344CB8AC3E}">
-        <p14:creationId xmlns:p14="http://schemas.microsoft.com/office/powerpoint/2010/main" val="541079645"/>
-      </p:ext>
-    </p:extLst>
-  </p:cSld>
-  <p:clrMapOvr>
-    <a:masterClrMapping/>
-  </p:clrMapOvr>
-  <p:transition spd="med"/>
-</p:sld>
-</file>
-
-<file path=ppt/slides/slide13.xml><?xml version="1.0" encoding="utf-8"?>
-<p:sld xmlns:a="http://schemas.openxmlformats.org/drawingml/2006/main" xmlns:r="http://schemas.openxmlformats.org/officeDocument/2006/relationships" xmlns:p="http://schemas.openxmlformats.org/presentationml/2006/main">
-  <p:cSld>
-    <p:spTree>
-      <p:nvGrpSpPr>
-        <p:cNvPr id="1" name=""/>
-        <p:cNvGrpSpPr/>
-        <p:nvPr/>
-      </p:nvGrpSpPr>
-      <p:grpSpPr>
-        <a:xfrm>
-          <a:off x="0" y="0"/>
-          <a:ext cx="0" cy="0"/>
-          <a:chOff x="0" y="0"/>
-          <a:chExt cx="0" cy="0"/>
-        </a:xfrm>
-      </p:grpSpPr>
-      <p:sp>
-        <p:nvSpPr>
-          <p:cNvPr id="3" name="Marcador de texto 2">
-            <a:extLst>
-              <a:ext uri="{FF2B5EF4-FFF2-40B4-BE49-F238E27FC236}">
-                <a16:creationId xmlns:a16="http://schemas.microsoft.com/office/drawing/2014/main" id="{9DCC41F9-537F-A0AD-1357-054C0AEA22A5}"/>
-              </a:ext>
-            </a:extLst>
-          </p:cNvPr>
-          <p:cNvSpPr>
-            <a:spLocks noGrp="1"/>
-          </p:cNvSpPr>
-          <p:nvPr>
-            <p:ph type="body" sz="quarter" idx="14"/>
-          </p:nvPr>
-        </p:nvSpPr>
-        <p:spPr>
-          <a:xfrm>
-            <a:off x="769362" y="720955"/>
-            <a:ext cx="19969230" cy="2203252"/>
-          </a:xfrm>
-        </p:spPr>
-        <p:txBody>
-          <a:bodyPr>
-            <a:normAutofit fontScale="70000" lnSpcReduction="20000"/>
-          </a:bodyPr>
-          <a:lstStyle/>
-          <a:p>
-            <a:r>
-              <a:rPr lang="es-CR" dirty="0">
-                <a:effectLst>
-                  <a:outerShdw blurRad="38100" dist="38100" dir="2700000" algn="tl">
-                    <a:srgbClr val="000000">
-                      <a:alpha val="43137"/>
-                    </a:srgbClr>
-                  </a:outerShdw>
-                </a:effectLst>
-              </a:rPr>
-              <a:t>Mostramos un mensaje </a:t>
-            </a:r>
-          </a:p>
-          <a:p>
-            <a:r>
-              <a:rPr lang="es-CR" dirty="0">
-                <a:effectLst>
-                  <a:outerShdw blurRad="38100" dist="38100" dir="2700000" algn="tl">
-                    <a:srgbClr val="000000">
-                      <a:alpha val="43137"/>
-                    </a:srgbClr>
-                  </a:outerShdw>
-                </a:effectLst>
-              </a:rPr>
-              <a:t>con los datos de conexión</a:t>
-            </a:r>
-          </a:p>
-        </p:txBody>
-      </p:sp>
-      <p:pic>
-        <p:nvPicPr>
-          <p:cNvPr id="4" name="Imagen 3">
-            <a:extLst>
-              <a:ext uri="{FF2B5EF4-FFF2-40B4-BE49-F238E27FC236}">
-                <a16:creationId xmlns:a16="http://schemas.microsoft.com/office/drawing/2014/main" id="{9156A829-8EDB-6F3D-5727-3B1D6CE5F415}"/>
-              </a:ext>
-            </a:extLst>
-          </p:cNvPr>
-          <p:cNvPicPr>
-            <a:picLocks noChangeAspect="1"/>
-          </p:cNvPicPr>
-          <p:nvPr/>
-        </p:nvPicPr>
-        <p:blipFill>
-          <a:blip r:embed="rId2"/>
-          <a:stretch>
-            <a:fillRect/>
-          </a:stretch>
-        </p:blipFill>
-        <p:spPr>
-          <a:xfrm>
-            <a:off x="600029" y="3202957"/>
-            <a:ext cx="23183942" cy="10334138"/>
-          </a:xfrm>
-          <a:prstGeom prst="rect">
-            <a:avLst/>
-          </a:prstGeom>
-        </p:spPr>
-      </p:pic>
-    </p:spTree>
-    <p:extLst>
-      <p:ext uri="{BB962C8B-B14F-4D97-AF65-F5344CB8AC3E}">
-        <p14:creationId xmlns:p14="http://schemas.microsoft.com/office/powerpoint/2010/main" val="125483841"/>
-      </p:ext>
-    </p:extLst>
-  </p:cSld>
-  <p:clrMapOvr>
-    <a:masterClrMapping/>
-  </p:clrMapOvr>
-  <p:transition spd="med"/>
-</p:sld>
-</file>
-
-<file path=ppt/slides/slide14.xml><?xml version="1.0" encoding="utf-8"?>
-<p:sld xmlns:a="http://schemas.openxmlformats.org/drawingml/2006/main" xmlns:r="http://schemas.openxmlformats.org/officeDocument/2006/relationships" xmlns:p="http://schemas.openxmlformats.org/presentationml/2006/main">
-  <p:cSld>
-    <p:spTree>
-      <p:nvGrpSpPr>
-        <p:cNvPr id="1" name=""/>
-        <p:cNvGrpSpPr/>
-        <p:nvPr/>
-      </p:nvGrpSpPr>
-      <p:grpSpPr>
-        <a:xfrm>
-          <a:off x="0" y="0"/>
-          <a:ext cx="0" cy="0"/>
-          <a:chOff x="0" y="0"/>
-          <a:chExt cx="0" cy="0"/>
-        </a:xfrm>
-      </p:grpSpPr>
-      <p:sp>
-        <p:nvSpPr>
-          <p:cNvPr id="3" name="Marcador de texto 2">
-            <a:extLst>
-              <a:ext uri="{FF2B5EF4-FFF2-40B4-BE49-F238E27FC236}">
-                <a16:creationId xmlns:a16="http://schemas.microsoft.com/office/drawing/2014/main" id="{9DCC41F9-537F-A0AD-1357-054C0AEA22A5}"/>
-              </a:ext>
-            </a:extLst>
-          </p:cNvPr>
-          <p:cNvSpPr>
-            <a:spLocks noGrp="1"/>
-          </p:cNvSpPr>
-          <p:nvPr>
-            <p:ph type="body" sz="quarter" idx="14"/>
-          </p:nvPr>
-        </p:nvSpPr>
-        <p:spPr>
-          <a:xfrm>
-            <a:off x="769362" y="720955"/>
-            <a:ext cx="18476383" cy="2203252"/>
-          </a:xfrm>
-        </p:spPr>
-        <p:txBody>
-          <a:bodyPr>
-            <a:normAutofit fontScale="92500"/>
-          </a:bodyPr>
-          <a:lstStyle/>
-          <a:p>
-            <a:r>
-              <a:rPr lang="es-CR" dirty="0">
-                <a:effectLst>
-                  <a:outerShdw blurRad="38100" dist="38100" dir="2700000" algn="tl">
-                    <a:srgbClr val="000000">
-                      <a:alpha val="43137"/>
-                    </a:srgbClr>
-                  </a:outerShdw>
-                </a:effectLst>
-              </a:rPr>
-              <a:t>Corremos el primer hola mundo</a:t>
-            </a:r>
-          </a:p>
-        </p:txBody>
-      </p:sp>
-      <p:pic>
-        <p:nvPicPr>
-          <p:cNvPr id="5" name="Imagen 4">
-            <a:extLst>
-              <a:ext uri="{FF2B5EF4-FFF2-40B4-BE49-F238E27FC236}">
-                <a16:creationId xmlns:a16="http://schemas.microsoft.com/office/drawing/2014/main" id="{48304627-1DAA-8B82-592A-8673A104F7B4}"/>
-              </a:ext>
-            </a:extLst>
-          </p:cNvPr>
-          <p:cNvPicPr>
-            <a:picLocks noChangeAspect="1"/>
-          </p:cNvPicPr>
-          <p:nvPr/>
-        </p:nvPicPr>
-        <p:blipFill>
-          <a:blip r:embed="rId2"/>
-          <a:stretch>
-            <a:fillRect/>
-          </a:stretch>
-        </p:blipFill>
-        <p:spPr>
-          <a:xfrm>
-            <a:off x="2929363" y="3881591"/>
-            <a:ext cx="18525274" cy="9252602"/>
-          </a:xfrm>
-          <a:prstGeom prst="rect">
-            <a:avLst/>
-          </a:prstGeom>
-        </p:spPr>
-      </p:pic>
-    </p:spTree>
-    <p:extLst>
-      <p:ext uri="{BB962C8B-B14F-4D97-AF65-F5344CB8AC3E}">
-        <p14:creationId xmlns:p14="http://schemas.microsoft.com/office/powerpoint/2010/main" val="1383008504"/>
-      </p:ext>
-    </p:extLst>
-  </p:cSld>
-  <p:clrMapOvr>
-    <a:masterClrMapping/>
-  </p:clrMapOvr>
-  <p:transition spd="med"/>
-</p:sld>
-</file>
-
-<file path=ppt/slides/slide15.xml><?xml version="1.0" encoding="utf-8"?>
-<p:sld xmlns:a="http://schemas.openxmlformats.org/drawingml/2006/main" xmlns:r="http://schemas.openxmlformats.org/officeDocument/2006/relationships" xmlns:p="http://schemas.openxmlformats.org/presentationml/2006/main">
-  <p:cSld>
-    <p:spTree>
-      <p:nvGrpSpPr>
-        <p:cNvPr id="1" name=""/>
-        <p:cNvGrpSpPr/>
-        <p:nvPr/>
-      </p:nvGrpSpPr>
-      <p:grpSpPr>
-        <a:xfrm>
-          <a:off x="0" y="0"/>
-          <a:ext cx="0" cy="0"/>
-          <a:chOff x="0" y="0"/>
-          <a:chExt cx="0" cy="0"/>
-        </a:xfrm>
-      </p:grpSpPr>
-      <p:sp>
-        <p:nvSpPr>
-          <p:cNvPr id="3" name="Marcador de texto 2">
-            <a:extLst>
-              <a:ext uri="{FF2B5EF4-FFF2-40B4-BE49-F238E27FC236}">
-                <a16:creationId xmlns:a16="http://schemas.microsoft.com/office/drawing/2014/main" id="{9DCC41F9-537F-A0AD-1357-054C0AEA22A5}"/>
-              </a:ext>
-            </a:extLst>
-          </p:cNvPr>
-          <p:cNvSpPr>
-            <a:spLocks noGrp="1"/>
-          </p:cNvSpPr>
-          <p:nvPr>
-            <p:ph type="body" sz="quarter" idx="14"/>
-          </p:nvPr>
-        </p:nvSpPr>
-        <p:spPr>
-          <a:xfrm>
-            <a:off x="769362" y="629515"/>
-            <a:ext cx="18476383" cy="2203252"/>
-          </a:xfrm>
-        </p:spPr>
-        <p:txBody>
-          <a:bodyPr>
-            <a:normAutofit fontScale="70000" lnSpcReduction="20000"/>
-          </a:bodyPr>
-          <a:lstStyle/>
-          <a:p>
-            <a:r>
-              <a:rPr lang="es-CR" dirty="0">
-                <a:effectLst>
-                  <a:outerShdw blurRad="38100" dist="38100" dir="2700000" algn="tl">
-                    <a:srgbClr val="000000">
-                      <a:alpha val="43137"/>
-                    </a:srgbClr>
-                  </a:outerShdw>
-                </a:effectLst>
-              </a:rPr>
-              <a:t>Le agregamos un campo de texto con el mismo @bind al Hola Mundo</a:t>
-            </a:r>
-          </a:p>
-        </p:txBody>
-      </p:sp>
-      <p:pic>
-        <p:nvPicPr>
-          <p:cNvPr id="5" name="Imagen 4">
-            <a:extLst>
-              <a:ext uri="{FF2B5EF4-FFF2-40B4-BE49-F238E27FC236}">
-                <a16:creationId xmlns:a16="http://schemas.microsoft.com/office/drawing/2014/main" id="{F1F49AD3-BE34-56A4-E7EF-62D8F8EB1486}"/>
-              </a:ext>
-            </a:extLst>
-          </p:cNvPr>
-          <p:cNvPicPr>
-            <a:picLocks noChangeAspect="1"/>
-          </p:cNvPicPr>
-          <p:nvPr/>
-        </p:nvPicPr>
-        <p:blipFill>
-          <a:blip r:embed="rId2"/>
-          <a:stretch>
-            <a:fillRect/>
-          </a:stretch>
-        </p:blipFill>
-        <p:spPr>
-          <a:xfrm>
-            <a:off x="2688254" y="3180239"/>
-            <a:ext cx="19007491" cy="10213259"/>
-          </a:xfrm>
-          <a:prstGeom prst="rect">
-            <a:avLst/>
-          </a:prstGeom>
-        </p:spPr>
-      </p:pic>
-    </p:spTree>
-    <p:extLst>
-      <p:ext uri="{BB962C8B-B14F-4D97-AF65-F5344CB8AC3E}">
-        <p14:creationId xmlns:p14="http://schemas.microsoft.com/office/powerpoint/2010/main" val="2898662069"/>
-      </p:ext>
-    </p:extLst>
-  </p:cSld>
-  <p:clrMapOvr>
-    <a:masterClrMapping/>
-  </p:clrMapOvr>
-  <p:transition spd="med"/>
-</p:sld>
-</file>
-
-<file path=ppt/slides/slide16.xml><?xml version="1.0" encoding="utf-8"?>
-<p:sld xmlns:a="http://schemas.openxmlformats.org/drawingml/2006/main" xmlns:r="http://schemas.openxmlformats.org/officeDocument/2006/relationships" xmlns:p="http://schemas.openxmlformats.org/presentationml/2006/main">
-  <p:cSld>
-    <p:spTree>
-      <p:nvGrpSpPr>
-        <p:cNvPr id="1" name=""/>
-        <p:cNvGrpSpPr/>
-        <p:nvPr/>
-      </p:nvGrpSpPr>
-      <p:grpSpPr>
-        <a:xfrm>
-          <a:off x="0" y="0"/>
-          <a:ext cx="0" cy="0"/>
-          <a:chOff x="0" y="0"/>
-          <a:chExt cx="0" cy="0"/>
-        </a:xfrm>
-      </p:grpSpPr>
-      <p:sp>
-        <p:nvSpPr>
-          <p:cNvPr id="3" name="Marcador de texto 2">
-            <a:extLst>
-              <a:ext uri="{FF2B5EF4-FFF2-40B4-BE49-F238E27FC236}">
-                <a16:creationId xmlns:a16="http://schemas.microsoft.com/office/drawing/2014/main" id="{9DCC41F9-537F-A0AD-1357-054C0AEA22A5}"/>
-              </a:ext>
-            </a:extLst>
-          </p:cNvPr>
-          <p:cNvSpPr>
-            <a:spLocks noGrp="1"/>
-          </p:cNvSpPr>
-          <p:nvPr>
-            <p:ph type="body" sz="quarter" idx="14"/>
-          </p:nvPr>
-        </p:nvSpPr>
-        <p:spPr>
-          <a:xfrm>
-            <a:off x="769362" y="720955"/>
-            <a:ext cx="18476383" cy="2203252"/>
-          </a:xfrm>
-        </p:spPr>
-        <p:txBody>
-          <a:bodyPr>
-            <a:normAutofit fontScale="85000" lnSpcReduction="10000"/>
-          </a:bodyPr>
-          <a:lstStyle/>
-          <a:p>
-            <a:r>
-              <a:rPr lang="es-CR" dirty="0">
-                <a:effectLst>
-                  <a:outerShdw blurRad="38100" dist="38100" dir="2700000" algn="tl">
-                    <a:srgbClr val="000000">
-                      <a:alpha val="43137"/>
-                    </a:srgbClr>
-                  </a:outerShdw>
-                </a:effectLst>
-              </a:rPr>
-              <a:t>Corremos el Hola Mundo modificado</a:t>
-            </a:r>
-          </a:p>
-        </p:txBody>
-      </p:sp>
-      <p:pic>
-        <p:nvPicPr>
-          <p:cNvPr id="4" name="Imagen 3">
-            <a:extLst>
-              <a:ext uri="{FF2B5EF4-FFF2-40B4-BE49-F238E27FC236}">
-                <a16:creationId xmlns:a16="http://schemas.microsoft.com/office/drawing/2014/main" id="{E5157E82-A611-2D6F-FF5E-95AE363865BA}"/>
-              </a:ext>
-            </a:extLst>
-          </p:cNvPr>
-          <p:cNvPicPr>
-            <a:picLocks noChangeAspect="1"/>
-          </p:cNvPicPr>
-          <p:nvPr/>
-        </p:nvPicPr>
-        <p:blipFill>
-          <a:blip r:embed="rId2"/>
-          <a:stretch>
-            <a:fillRect/>
-          </a:stretch>
-        </p:blipFill>
-        <p:spPr>
-          <a:xfrm>
-            <a:off x="3667202" y="3088799"/>
-            <a:ext cx="17049596" cy="10199313"/>
-          </a:xfrm>
-          <a:prstGeom prst="rect">
-            <a:avLst/>
-          </a:prstGeom>
-        </p:spPr>
-      </p:pic>
-    </p:spTree>
-    <p:extLst>
-      <p:ext uri="{BB962C8B-B14F-4D97-AF65-F5344CB8AC3E}">
-        <p14:creationId xmlns:p14="http://schemas.microsoft.com/office/powerpoint/2010/main" val="1045787560"/>
-      </p:ext>
-    </p:extLst>
-  </p:cSld>
-  <p:clrMapOvr>
-    <a:masterClrMapping/>
-  </p:clrMapOvr>
-  <p:transition spd="med"/>
-</p:sld>
-</file>
-
-<file path=ppt/slides/slide17.xml><?xml version="1.0" encoding="utf-8"?>
-<p:sld xmlns:a="http://schemas.openxmlformats.org/drawingml/2006/main" xmlns:r="http://schemas.openxmlformats.org/officeDocument/2006/relationships" xmlns:p="http://schemas.openxmlformats.org/presentationml/2006/main">
-  <p:cSld>
-    <p:spTree>
-      <p:nvGrpSpPr>
-        <p:cNvPr id="1" name=""/>
-        <p:cNvGrpSpPr/>
-        <p:nvPr/>
-      </p:nvGrpSpPr>
-      <p:grpSpPr>
-        <a:xfrm>
-          <a:off x="0" y="0"/>
-          <a:ext cx="0" cy="0"/>
-          <a:chOff x="0" y="0"/>
-          <a:chExt cx="0" cy="0"/>
-        </a:xfrm>
-      </p:grpSpPr>
-      <p:sp>
-        <p:nvSpPr>
-          <p:cNvPr id="3" name="Marcador de texto 2">
-            <a:extLst>
-              <a:ext uri="{FF2B5EF4-FFF2-40B4-BE49-F238E27FC236}">
-                <a16:creationId xmlns:a16="http://schemas.microsoft.com/office/drawing/2014/main" id="{2716B7AD-09D5-2A8B-E65D-55F030BD46B8}"/>
-              </a:ext>
-            </a:extLst>
-          </p:cNvPr>
-          <p:cNvSpPr>
-            <a:spLocks noGrp="1"/>
-          </p:cNvSpPr>
-          <p:nvPr>
-            <p:ph type="body" sz="quarter" idx="14"/>
-          </p:nvPr>
-        </p:nvSpPr>
-        <p:spPr>
-          <a:xfrm>
-            <a:off x="2953808" y="5213442"/>
-            <a:ext cx="18476383" cy="2203252"/>
-          </a:xfrm>
-        </p:spPr>
-        <p:txBody>
-          <a:bodyPr>
-            <a:normAutofit fontScale="85000" lnSpcReduction="10000"/>
-          </a:bodyPr>
-          <a:lstStyle/>
-          <a:p>
-            <a:pPr algn="ctr"/>
-            <a:r>
-              <a:rPr lang="es-CR" dirty="0">
-                <a:effectLst>
-                  <a:outerShdw blurRad="38100" dist="38100" dir="2700000" algn="tl">
-                    <a:srgbClr val="000000">
-                      <a:alpha val="43137"/>
-                    </a:srgbClr>
-                  </a:outerShdw>
-                </a:effectLst>
-              </a:rPr>
-              <a:t>Creamos un organizador de tareas</a:t>
-            </a:r>
-          </a:p>
-        </p:txBody>
-      </p:sp>
-    </p:spTree>
-    <p:extLst>
-      <p:ext uri="{BB962C8B-B14F-4D97-AF65-F5344CB8AC3E}">
-        <p14:creationId xmlns:p14="http://schemas.microsoft.com/office/powerpoint/2010/main" val="3322519666"/>
-      </p:ext>
-    </p:extLst>
-  </p:cSld>
-  <p:clrMapOvr>
-    <a:masterClrMapping/>
-  </p:clrMapOvr>
-  <p:transition spd="med"/>
-</p:sld>
-</file>
-
-<file path=ppt/slides/slide18.xml><?xml version="1.0" encoding="utf-8"?>
-<p:sld xmlns:a="http://schemas.openxmlformats.org/drawingml/2006/main" xmlns:r="http://schemas.openxmlformats.org/officeDocument/2006/relationships" xmlns:p="http://schemas.openxmlformats.org/presentationml/2006/main">
-  <p:cSld>
-    <p:spTree>
-      <p:nvGrpSpPr>
-        <p:cNvPr id="1" name=""/>
-        <p:cNvGrpSpPr/>
-        <p:nvPr/>
-      </p:nvGrpSpPr>
-      <p:grpSpPr>
-        <a:xfrm>
-          <a:off x="0" y="0"/>
-          <a:ext cx="0" cy="0"/>
-          <a:chOff x="0" y="0"/>
-          <a:chExt cx="0" cy="0"/>
-        </a:xfrm>
-      </p:grpSpPr>
-      <p:sp>
-        <p:nvSpPr>
-          <p:cNvPr id="3" name="Marcador de texto 2">
-            <a:extLst>
-              <a:ext uri="{FF2B5EF4-FFF2-40B4-BE49-F238E27FC236}">
-                <a16:creationId xmlns:a16="http://schemas.microsoft.com/office/drawing/2014/main" id="{03B77667-72DC-1178-5CD1-200B75D13E5B}"/>
-              </a:ext>
-            </a:extLst>
-          </p:cNvPr>
-          <p:cNvSpPr>
-            <a:spLocks noGrp="1"/>
-          </p:cNvSpPr>
-          <p:nvPr>
-            <p:ph type="body" sz="quarter" idx="14"/>
-          </p:nvPr>
-        </p:nvSpPr>
-        <p:spPr>
-          <a:xfrm>
-            <a:off x="655658" y="685969"/>
-            <a:ext cx="20028070" cy="1526879"/>
-          </a:xfrm>
-        </p:spPr>
-        <p:txBody>
-          <a:bodyPr>
-            <a:normAutofit fontScale="55000" lnSpcReduction="20000"/>
-          </a:bodyPr>
-          <a:lstStyle/>
-          <a:p>
-            <a:r>
-              <a:rPr lang="es-CR" dirty="0">
-                <a:effectLst>
-                  <a:outerShdw blurRad="38100" dist="38100" dir="2700000" algn="tl">
-                    <a:srgbClr val="000000">
-                      <a:alpha val="43137"/>
-                    </a:srgbClr>
-                  </a:outerShdw>
-                </a:effectLst>
-              </a:rPr>
-              <a:t>Agregamos un componente de </a:t>
-            </a:r>
-            <a:r>
-              <a:rPr lang="es-CR" dirty="0" err="1">
-                <a:effectLst>
-                  <a:outerShdw blurRad="38100" dist="38100" dir="2700000" algn="tl">
-                    <a:srgbClr val="000000">
-                      <a:alpha val="43137"/>
-                    </a:srgbClr>
-                  </a:outerShdw>
-                </a:effectLst>
-              </a:rPr>
-              <a:t>Razor</a:t>
-            </a:r>
-            <a:r>
-              <a:rPr lang="es-CR" dirty="0">
-                <a:effectLst>
-                  <a:outerShdw blurRad="38100" dist="38100" dir="2700000" algn="tl">
-                    <a:srgbClr val="000000">
-                      <a:alpha val="43137"/>
-                    </a:srgbClr>
-                  </a:outerShdw>
-                </a:effectLst>
-              </a:rPr>
-              <a:t> llamado: </a:t>
-            </a:r>
-            <a:r>
-              <a:rPr lang="es-CR" dirty="0" err="1">
-                <a:effectLst>
-                  <a:outerShdw blurRad="38100" dist="38100" dir="2700000" algn="tl">
-                    <a:srgbClr val="000000">
-                      <a:alpha val="43137"/>
-                    </a:srgbClr>
-                  </a:outerShdw>
-                </a:effectLst>
-              </a:rPr>
-              <a:t>Todo.razor</a:t>
-            </a:r>
-            <a:endParaRPr lang="es-CR" dirty="0">
-              <a:effectLst>
-                <a:outerShdw blurRad="38100" dist="38100" dir="2700000" algn="tl">
-                  <a:srgbClr val="000000">
-                    <a:alpha val="43137"/>
-                  </a:srgbClr>
-                </a:outerShdw>
-              </a:effectLst>
-            </a:endParaRPr>
-          </a:p>
-        </p:txBody>
-      </p:sp>
-      <p:pic>
-        <p:nvPicPr>
-          <p:cNvPr id="5" name="Imagen 4">
-            <a:extLst>
-              <a:ext uri="{FF2B5EF4-FFF2-40B4-BE49-F238E27FC236}">
-                <a16:creationId xmlns:a16="http://schemas.microsoft.com/office/drawing/2014/main" id="{4CDBCDB9-DA69-A413-01C3-6A19E31E7CB5}"/>
-              </a:ext>
-            </a:extLst>
-          </p:cNvPr>
-          <p:cNvPicPr>
-            <a:picLocks noChangeAspect="1"/>
-          </p:cNvPicPr>
-          <p:nvPr/>
-        </p:nvPicPr>
-        <p:blipFill>
-          <a:blip r:embed="rId2"/>
-          <a:stretch>
-            <a:fillRect/>
-          </a:stretch>
-        </p:blipFill>
-        <p:spPr>
-          <a:xfrm>
-            <a:off x="180170" y="2468880"/>
-            <a:ext cx="12997568" cy="6638543"/>
-          </a:xfrm>
-          <a:prstGeom prst="rect">
-            <a:avLst/>
-          </a:prstGeom>
-        </p:spPr>
-      </p:pic>
-      <p:pic>
-        <p:nvPicPr>
-          <p:cNvPr id="7" name="Imagen 6">
-            <a:extLst>
-              <a:ext uri="{FF2B5EF4-FFF2-40B4-BE49-F238E27FC236}">
-                <a16:creationId xmlns:a16="http://schemas.microsoft.com/office/drawing/2014/main" id="{D89D4984-0B1A-C73E-A961-309C36800DA0}"/>
-              </a:ext>
-            </a:extLst>
-          </p:cNvPr>
-          <p:cNvPicPr>
-            <a:picLocks noChangeAspect="1"/>
-          </p:cNvPicPr>
-          <p:nvPr/>
-        </p:nvPicPr>
-        <p:blipFill>
-          <a:blip r:embed="rId3"/>
-          <a:stretch>
-            <a:fillRect/>
-          </a:stretch>
-        </p:blipFill>
-        <p:spPr>
-          <a:xfrm>
-            <a:off x="13484014" y="6189813"/>
-            <a:ext cx="10808208" cy="7471323"/>
-          </a:xfrm>
-          <a:prstGeom prst="rect">
-            <a:avLst/>
-          </a:prstGeom>
-        </p:spPr>
-      </p:pic>
-    </p:spTree>
-    <p:extLst>
-      <p:ext uri="{BB962C8B-B14F-4D97-AF65-F5344CB8AC3E}">
-        <p14:creationId xmlns:p14="http://schemas.microsoft.com/office/powerpoint/2010/main" val="2412632723"/>
-      </p:ext>
-    </p:extLst>
-  </p:cSld>
-  <p:clrMapOvr>
-    <a:masterClrMapping/>
-  </p:clrMapOvr>
-  <p:transition spd="med"/>
-</p:sld>
-</file>
-
-<file path=ppt/slides/slide19.xml><?xml version="1.0" encoding="utf-8"?>
-<p:sld xmlns:a="http://schemas.openxmlformats.org/drawingml/2006/main" xmlns:r="http://schemas.openxmlformats.org/officeDocument/2006/relationships" xmlns:p="http://schemas.openxmlformats.org/presentationml/2006/main">
-  <p:cSld>
-    <p:spTree>
-      <p:nvGrpSpPr>
-        <p:cNvPr id="1" name=""/>
-        <p:cNvGrpSpPr/>
-        <p:nvPr/>
-      </p:nvGrpSpPr>
-      <p:grpSpPr>
-        <a:xfrm>
-          <a:off x="0" y="0"/>
-          <a:ext cx="0" cy="0"/>
-          <a:chOff x="0" y="0"/>
-          <a:chExt cx="0" cy="0"/>
-        </a:xfrm>
-      </p:grpSpPr>
-      <p:sp>
-        <p:nvSpPr>
-          <p:cNvPr id="3" name="Marcador de texto 2">
-            <a:extLst>
-              <a:ext uri="{FF2B5EF4-FFF2-40B4-BE49-F238E27FC236}">
-                <a16:creationId xmlns:a16="http://schemas.microsoft.com/office/drawing/2014/main" id="{329CFE2D-FCA6-DB66-DA5E-0D1549694B02}"/>
-              </a:ext>
-            </a:extLst>
-          </p:cNvPr>
-          <p:cNvSpPr>
-            <a:spLocks noGrp="1"/>
-          </p:cNvSpPr>
-          <p:nvPr>
-            <p:ph type="body" sz="quarter" idx="14"/>
-          </p:nvPr>
-        </p:nvSpPr>
-        <p:spPr>
-          <a:xfrm>
-            <a:off x="728810" y="722545"/>
-            <a:ext cx="19928823" cy="2093807"/>
-          </a:xfrm>
-        </p:spPr>
-        <p:txBody>
-          <a:bodyPr>
-            <a:normAutofit fontScale="70000" lnSpcReduction="20000"/>
-          </a:bodyPr>
-          <a:lstStyle/>
-          <a:p>
-            <a:r>
-              <a:rPr lang="es-CR" dirty="0">
-                <a:effectLst>
-                  <a:outerShdw blurRad="38100" dist="38100" dir="2700000" algn="tl">
-                    <a:srgbClr val="000000">
-                      <a:alpha val="43137"/>
-                    </a:srgbClr>
-                  </a:outerShdw>
-                </a:effectLst>
-              </a:rPr>
-              <a:t>Agregamos una clase modelo para </a:t>
-            </a:r>
-          </a:p>
-          <a:p>
-            <a:r>
-              <a:rPr lang="es-CR" dirty="0">
-                <a:effectLst>
-                  <a:outerShdw blurRad="38100" dist="38100" dir="2700000" algn="tl">
-                    <a:srgbClr val="000000">
-                      <a:alpha val="43137"/>
-                    </a:srgbClr>
-                  </a:outerShdw>
-                </a:effectLst>
-              </a:rPr>
-              <a:t>cada tarea de nuestra lista de tareas</a:t>
-            </a:r>
-          </a:p>
-        </p:txBody>
-      </p:sp>
-      <p:pic>
-        <p:nvPicPr>
-          <p:cNvPr id="7" name="Imagen 6">
-            <a:extLst>
-              <a:ext uri="{FF2B5EF4-FFF2-40B4-BE49-F238E27FC236}">
-                <a16:creationId xmlns:a16="http://schemas.microsoft.com/office/drawing/2014/main" id="{F969565C-C96C-D982-5ACC-C00573A5857A}"/>
-              </a:ext>
-            </a:extLst>
-          </p:cNvPr>
-          <p:cNvPicPr>
-            <a:picLocks noChangeAspect="1"/>
-          </p:cNvPicPr>
-          <p:nvPr/>
-        </p:nvPicPr>
-        <p:blipFill>
-          <a:blip r:embed="rId2"/>
-          <a:stretch>
-            <a:fillRect/>
-          </a:stretch>
-        </p:blipFill>
-        <p:spPr>
-          <a:xfrm>
-            <a:off x="1519954" y="3579960"/>
-            <a:ext cx="21344091" cy="6556079"/>
-          </a:xfrm>
-          <a:prstGeom prst="rect">
-            <a:avLst/>
-          </a:prstGeom>
-        </p:spPr>
-      </p:pic>
-    </p:spTree>
-    <p:extLst>
-      <p:ext uri="{BB962C8B-B14F-4D97-AF65-F5344CB8AC3E}">
-        <p14:creationId xmlns:p14="http://schemas.microsoft.com/office/powerpoint/2010/main" val="103909853"/>
-      </p:ext>
-    </p:extLst>
   </p:cSld>
   <p:clrMapOvr>
     <a:masterClrMapping/>
@@ -3640,7 +2478,7 @@
         </p:spPr>
         <p:txBody>
           <a:bodyPr>
-            <a:normAutofit fontScale="77500" lnSpcReduction="20000"/>
+            <a:normAutofit fontScale="70000" lnSpcReduction="20000"/>
           </a:bodyPr>
           <a:lstStyle/>
           <a:p>
@@ -3654,38 +2492,17 @@
                   </a:outerShdw>
                 </a:effectLst>
               </a:rPr>
-              <a:t>Creamos una aplicación ,Net MAUI </a:t>
+              <a:t>Se le hacen algunos cambios a la clase modelo</a:t>
             </a:r>
-            <a:r>
-              <a:rPr lang="es-CR" dirty="0" err="1">
-                <a:effectLst>
-                  <a:outerShdw blurRad="38100" dist="38100" dir="2700000" algn="tl">
-                    <a:srgbClr val="000000">
-                      <a:alpha val="43137"/>
-                    </a:srgbClr>
-                  </a:outerShdw>
-                </a:effectLst>
-              </a:rPr>
-              <a:t>Blazor</a:t>
-            </a:r>
-            <a:endParaRPr lang="es-CR" dirty="0">
-              <a:effectLst>
-                <a:outerShdw blurRad="38100" dist="38100" dir="2700000" algn="tl">
-                  <a:srgbClr val="000000">
-                    <a:alpha val="43137"/>
-                  </a:srgbClr>
-                </a:outerShdw>
-              </a:effectLst>
-            </a:endParaRPr>
           </a:p>
         </p:txBody>
       </p:sp>
       <p:pic>
         <p:nvPicPr>
-          <p:cNvPr id="4" name="Imagen 3">
+          <p:cNvPr id="5" name="Imagen 4">
             <a:extLst>
               <a:ext uri="{FF2B5EF4-FFF2-40B4-BE49-F238E27FC236}">
-                <a16:creationId xmlns:a16="http://schemas.microsoft.com/office/drawing/2014/main" id="{0B254800-B9C9-4482-C26E-25D0146284AA}"/>
+                <a16:creationId xmlns:a16="http://schemas.microsoft.com/office/drawing/2014/main" id="{E50A8FB4-BCF0-A727-102D-FF247F950A24}"/>
               </a:ext>
             </a:extLst>
           </p:cNvPr>
@@ -3702,8 +2519,8 @@
         </p:blipFill>
         <p:spPr>
           <a:xfrm>
-            <a:off x="3090664" y="3101009"/>
-            <a:ext cx="15316605" cy="10223140"/>
+            <a:off x="1591244" y="3328417"/>
+            <a:ext cx="21201512" cy="9235670"/>
           </a:xfrm>
           <a:prstGeom prst="rect">
             <a:avLst/>
@@ -3716,607 +2533,6 @@
         <p14:creationId xmlns:p14="http://schemas.microsoft.com/office/powerpoint/2010/main" val="2952813357"/>
       </p:ext>
     </p:extLst>
-  </p:cSld>
-  <p:clrMapOvr>
-    <a:masterClrMapping/>
-  </p:clrMapOvr>
-  <p:transition spd="med"/>
-</p:sld>
-</file>
-
-<file path=ppt/slides/slide20.xml><?xml version="1.0" encoding="utf-8"?>
-<p:sld xmlns:a="http://schemas.openxmlformats.org/drawingml/2006/main" xmlns:r="http://schemas.openxmlformats.org/officeDocument/2006/relationships" xmlns:p="http://schemas.openxmlformats.org/presentationml/2006/main">
-  <p:cSld>
-    <p:spTree>
-      <p:nvGrpSpPr>
-        <p:cNvPr id="1" name=""/>
-        <p:cNvGrpSpPr/>
-        <p:nvPr/>
-      </p:nvGrpSpPr>
-      <p:grpSpPr>
-        <a:xfrm>
-          <a:off x="0" y="0"/>
-          <a:ext cx="0" cy="0"/>
-          <a:chOff x="0" y="0"/>
-          <a:chExt cx="0" cy="0"/>
-        </a:xfrm>
-      </p:grpSpPr>
-      <p:sp>
-        <p:nvSpPr>
-          <p:cNvPr id="3" name="Marcador de texto 2">
-            <a:extLst>
-              <a:ext uri="{FF2B5EF4-FFF2-40B4-BE49-F238E27FC236}">
-                <a16:creationId xmlns:a16="http://schemas.microsoft.com/office/drawing/2014/main" id="{2F984C87-2FF9-77F2-D9D0-6F044206D6F8}"/>
-              </a:ext>
-            </a:extLst>
-          </p:cNvPr>
-          <p:cNvSpPr>
-            <a:spLocks noGrp="1"/>
-          </p:cNvSpPr>
-          <p:nvPr>
-            <p:ph type="body" sz="quarter" idx="14"/>
-          </p:nvPr>
-        </p:nvSpPr>
-        <p:spPr>
-          <a:xfrm>
-            <a:off x="710522" y="777408"/>
-            <a:ext cx="19735462" cy="2368127"/>
-          </a:xfrm>
-        </p:spPr>
-        <p:txBody>
-          <a:bodyPr>
-            <a:normAutofit fontScale="77500" lnSpcReduction="20000"/>
-          </a:bodyPr>
-          <a:lstStyle/>
-          <a:p>
-            <a:r>
-              <a:rPr lang="es-CR" dirty="0">
-                <a:effectLst>
-                  <a:outerShdw blurRad="38100" dist="38100" dir="2700000" algn="tl">
-                    <a:srgbClr val="000000">
-                      <a:alpha val="43137"/>
-                    </a:srgbClr>
-                  </a:outerShdw>
-                </a:effectLst>
-              </a:rPr>
-              <a:t>Agregamos las etiquetas necesarias para mostrar la lista de tareas en pantalla</a:t>
-            </a:r>
-          </a:p>
-        </p:txBody>
-      </p:sp>
-      <p:pic>
-        <p:nvPicPr>
-          <p:cNvPr id="5" name="Imagen 4">
-            <a:extLst>
-              <a:ext uri="{FF2B5EF4-FFF2-40B4-BE49-F238E27FC236}">
-                <a16:creationId xmlns:a16="http://schemas.microsoft.com/office/drawing/2014/main" id="{CBD0AFE5-6F79-6BE9-BC2A-0284AB547847}"/>
-              </a:ext>
-            </a:extLst>
-          </p:cNvPr>
-          <p:cNvPicPr>
-            <a:picLocks noChangeAspect="1"/>
-          </p:cNvPicPr>
-          <p:nvPr/>
-        </p:nvPicPr>
-        <p:blipFill>
-          <a:blip r:embed="rId2"/>
-          <a:stretch>
-            <a:fillRect/>
-          </a:stretch>
-        </p:blipFill>
-        <p:spPr>
-          <a:xfrm>
-            <a:off x="1559966" y="3600273"/>
-            <a:ext cx="20588923" cy="9338319"/>
-          </a:xfrm>
-          <a:prstGeom prst="rect">
-            <a:avLst/>
-          </a:prstGeom>
-        </p:spPr>
-      </p:pic>
-    </p:spTree>
-    <p:extLst>
-      <p:ext uri="{BB962C8B-B14F-4D97-AF65-F5344CB8AC3E}">
-        <p14:creationId xmlns:p14="http://schemas.microsoft.com/office/powerpoint/2010/main" val="961168037"/>
-      </p:ext>
-    </p:extLst>
-  </p:cSld>
-  <p:clrMapOvr>
-    <a:masterClrMapping/>
-  </p:clrMapOvr>
-  <p:transition spd="med"/>
-</p:sld>
-</file>
-
-<file path=ppt/slides/slide21.xml><?xml version="1.0" encoding="utf-8"?>
-<p:sld xmlns:a="http://schemas.openxmlformats.org/drawingml/2006/main" xmlns:r="http://schemas.openxmlformats.org/officeDocument/2006/relationships" xmlns:p="http://schemas.openxmlformats.org/presentationml/2006/main">
-  <p:cSld>
-    <p:spTree>
-      <p:nvGrpSpPr>
-        <p:cNvPr id="1" name=""/>
-        <p:cNvGrpSpPr/>
-        <p:nvPr/>
-      </p:nvGrpSpPr>
-      <p:grpSpPr>
-        <a:xfrm>
-          <a:off x="0" y="0"/>
-          <a:ext cx="0" cy="0"/>
-          <a:chOff x="0" y="0"/>
-          <a:chExt cx="0" cy="0"/>
-        </a:xfrm>
-      </p:grpSpPr>
-      <p:sp>
-        <p:nvSpPr>
-          <p:cNvPr id="3" name="Marcador de texto 2">
-            <a:extLst>
-              <a:ext uri="{FF2B5EF4-FFF2-40B4-BE49-F238E27FC236}">
-                <a16:creationId xmlns:a16="http://schemas.microsoft.com/office/drawing/2014/main" id="{57E649C4-0A16-9371-3ABF-A48643F42A05}"/>
-              </a:ext>
-            </a:extLst>
-          </p:cNvPr>
-          <p:cNvSpPr>
-            <a:spLocks noGrp="1"/>
-          </p:cNvSpPr>
-          <p:nvPr>
-            <p:ph type="body" sz="quarter" idx="14"/>
-          </p:nvPr>
-        </p:nvSpPr>
-        <p:spPr>
-          <a:xfrm>
-            <a:off x="728810" y="836867"/>
-            <a:ext cx="19918342" cy="2203252"/>
-          </a:xfrm>
-        </p:spPr>
-        <p:txBody>
-          <a:bodyPr>
-            <a:normAutofit fontScale="70000" lnSpcReduction="20000"/>
-          </a:bodyPr>
-          <a:lstStyle/>
-          <a:p>
-            <a:r>
-              <a:rPr lang="es-CR" dirty="0">
-                <a:effectLst>
-                  <a:outerShdw blurRad="38100" dist="38100" dir="2700000" algn="tl">
-                    <a:srgbClr val="000000">
-                      <a:alpha val="43137"/>
-                    </a:srgbClr>
-                  </a:outerShdw>
-                </a:effectLst>
-              </a:rPr>
-              <a:t>Copiamos, pegamos y modificamos un nuevo elemento para el menú lateral de la App</a:t>
-            </a:r>
-          </a:p>
-        </p:txBody>
-      </p:sp>
-      <p:pic>
-        <p:nvPicPr>
-          <p:cNvPr id="5" name="Imagen 4">
-            <a:extLst>
-              <a:ext uri="{FF2B5EF4-FFF2-40B4-BE49-F238E27FC236}">
-                <a16:creationId xmlns:a16="http://schemas.microsoft.com/office/drawing/2014/main" id="{1A9ADEF4-6B2A-405D-0077-1BA219C7B021}"/>
-              </a:ext>
-            </a:extLst>
-          </p:cNvPr>
-          <p:cNvPicPr>
-            <a:picLocks noChangeAspect="1"/>
-          </p:cNvPicPr>
-          <p:nvPr/>
-        </p:nvPicPr>
-        <p:blipFill>
-          <a:blip r:embed="rId2"/>
-          <a:stretch>
-            <a:fillRect/>
-          </a:stretch>
-        </p:blipFill>
-        <p:spPr>
-          <a:xfrm>
-            <a:off x="478743" y="3735133"/>
-            <a:ext cx="23426513" cy="9144000"/>
-          </a:xfrm>
-          <a:prstGeom prst="rect">
-            <a:avLst/>
-          </a:prstGeom>
-        </p:spPr>
-      </p:pic>
-    </p:spTree>
-    <p:extLst>
-      <p:ext uri="{BB962C8B-B14F-4D97-AF65-F5344CB8AC3E}">
-        <p14:creationId xmlns:p14="http://schemas.microsoft.com/office/powerpoint/2010/main" val="2739804124"/>
-      </p:ext>
-    </p:extLst>
-  </p:cSld>
-  <p:clrMapOvr>
-    <a:masterClrMapping/>
-  </p:clrMapOvr>
-  <p:transition spd="med"/>
-</p:sld>
-</file>
-
-<file path=ppt/slides/slide22.xml><?xml version="1.0" encoding="utf-8"?>
-<p:sld xmlns:a="http://schemas.openxmlformats.org/drawingml/2006/main" xmlns:r="http://schemas.openxmlformats.org/officeDocument/2006/relationships" xmlns:p="http://schemas.openxmlformats.org/presentationml/2006/main">
-  <p:cSld>
-    <p:spTree>
-      <p:nvGrpSpPr>
-        <p:cNvPr id="1" name=""/>
-        <p:cNvGrpSpPr/>
-        <p:nvPr/>
-      </p:nvGrpSpPr>
-      <p:grpSpPr>
-        <a:xfrm>
-          <a:off x="0" y="0"/>
-          <a:ext cx="0" cy="0"/>
-          <a:chOff x="0" y="0"/>
-          <a:chExt cx="0" cy="0"/>
-        </a:xfrm>
-      </p:grpSpPr>
-      <p:sp>
-        <p:nvSpPr>
-          <p:cNvPr id="3" name="Marcador de texto 2">
-            <a:extLst>
-              <a:ext uri="{FF2B5EF4-FFF2-40B4-BE49-F238E27FC236}">
-                <a16:creationId xmlns:a16="http://schemas.microsoft.com/office/drawing/2014/main" id="{105FBA9C-709D-B140-4AD5-E74D5A9F0F0C}"/>
-              </a:ext>
-            </a:extLst>
-          </p:cNvPr>
-          <p:cNvSpPr>
-            <a:spLocks noGrp="1"/>
-          </p:cNvSpPr>
-          <p:nvPr>
-            <p:ph type="body" sz="quarter" idx="14"/>
-          </p:nvPr>
-        </p:nvSpPr>
-        <p:spPr>
-          <a:xfrm>
-            <a:off x="783675" y="843398"/>
-            <a:ext cx="18235846" cy="1223146"/>
-          </a:xfrm>
-        </p:spPr>
-        <p:txBody>
-          <a:bodyPr>
-            <a:normAutofit fontScale="77500" lnSpcReduction="20000"/>
-          </a:bodyPr>
-          <a:lstStyle/>
-          <a:p>
-            <a:r>
-              <a:rPr lang="es-CR" dirty="0">
-                <a:effectLst>
-                  <a:outerShdw blurRad="38100" dist="38100" dir="2700000" algn="tl">
-                    <a:srgbClr val="000000">
-                      <a:alpha val="43137"/>
-                    </a:srgbClr>
-                  </a:outerShdw>
-                </a:effectLst>
-              </a:rPr>
-              <a:t>Corremos el App para probarla</a:t>
-            </a:r>
-          </a:p>
-        </p:txBody>
-      </p:sp>
-      <p:pic>
-        <p:nvPicPr>
-          <p:cNvPr id="5" name="Imagen 4">
-            <a:extLst>
-              <a:ext uri="{FF2B5EF4-FFF2-40B4-BE49-F238E27FC236}">
-                <a16:creationId xmlns:a16="http://schemas.microsoft.com/office/drawing/2014/main" id="{51DD6102-8321-2F06-2E19-A8F237397DFA}"/>
-              </a:ext>
-            </a:extLst>
-          </p:cNvPr>
-          <p:cNvPicPr>
-            <a:picLocks noChangeAspect="1"/>
-          </p:cNvPicPr>
-          <p:nvPr/>
-        </p:nvPicPr>
-        <p:blipFill>
-          <a:blip r:embed="rId2"/>
-          <a:stretch>
-            <a:fillRect/>
-          </a:stretch>
-        </p:blipFill>
-        <p:spPr>
-          <a:xfrm>
-            <a:off x="1910650" y="2706624"/>
-            <a:ext cx="19154380" cy="10312282"/>
-          </a:xfrm>
-          <a:prstGeom prst="rect">
-            <a:avLst/>
-          </a:prstGeom>
-        </p:spPr>
-      </p:pic>
-    </p:spTree>
-    <p:extLst>
-      <p:ext uri="{BB962C8B-B14F-4D97-AF65-F5344CB8AC3E}">
-        <p14:creationId xmlns:p14="http://schemas.microsoft.com/office/powerpoint/2010/main" val="2462649684"/>
-      </p:ext>
-    </p:extLst>
-  </p:cSld>
-  <p:clrMapOvr>
-    <a:masterClrMapping/>
-  </p:clrMapOvr>
-  <p:transition spd="med"/>
-</p:sld>
-</file>
-
-<file path=ppt/slides/slide23.xml><?xml version="1.0" encoding="utf-8"?>
-<p:sld xmlns:a="http://schemas.openxmlformats.org/drawingml/2006/main" xmlns:r="http://schemas.openxmlformats.org/officeDocument/2006/relationships" xmlns:p="http://schemas.openxmlformats.org/presentationml/2006/main">
-  <p:cSld>
-    <p:spTree>
-      <p:nvGrpSpPr>
-        <p:cNvPr id="1" name=""/>
-        <p:cNvGrpSpPr/>
-        <p:nvPr/>
-      </p:nvGrpSpPr>
-      <p:grpSpPr>
-        <a:xfrm>
-          <a:off x="0" y="0"/>
-          <a:ext cx="0" cy="0"/>
-          <a:chOff x="0" y="0"/>
-          <a:chExt cx="0" cy="0"/>
-        </a:xfrm>
-      </p:grpSpPr>
-      <p:sp>
-        <p:nvSpPr>
-          <p:cNvPr id="3" name="Marcador de texto 2">
-            <a:extLst>
-              <a:ext uri="{FF2B5EF4-FFF2-40B4-BE49-F238E27FC236}">
-                <a16:creationId xmlns:a16="http://schemas.microsoft.com/office/drawing/2014/main" id="{FF7B5991-0863-2409-D4DF-B9E9CD0A3C26}"/>
-              </a:ext>
-            </a:extLst>
-          </p:cNvPr>
-          <p:cNvSpPr>
-            <a:spLocks noGrp="1"/>
-          </p:cNvSpPr>
-          <p:nvPr>
-            <p:ph type="body" sz="quarter" idx="14"/>
-          </p:nvPr>
-        </p:nvSpPr>
-        <p:spPr>
-          <a:xfrm>
-            <a:off x="1670303" y="2611303"/>
-            <a:ext cx="7427638" cy="5861135"/>
-          </a:xfrm>
-        </p:spPr>
-        <p:txBody>
-          <a:bodyPr>
-            <a:normAutofit fontScale="77500" lnSpcReduction="20000"/>
-          </a:bodyPr>
-          <a:lstStyle/>
-          <a:p>
-            <a:r>
-              <a:rPr lang="es-CR" dirty="0">
-                <a:effectLst>
-                  <a:outerShdw blurRad="38100" dist="38100" dir="2700000" algn="tl">
-                    <a:srgbClr val="000000">
-                      <a:alpha val="43137"/>
-                    </a:srgbClr>
-                  </a:outerShdw>
-                </a:effectLst>
-              </a:rPr>
-              <a:t>Agregamos un método para darle acción al organizador de tareas</a:t>
-            </a:r>
-          </a:p>
-        </p:txBody>
-      </p:sp>
-      <p:pic>
-        <p:nvPicPr>
-          <p:cNvPr id="5" name="Imagen 4">
-            <a:extLst>
-              <a:ext uri="{FF2B5EF4-FFF2-40B4-BE49-F238E27FC236}">
-                <a16:creationId xmlns:a16="http://schemas.microsoft.com/office/drawing/2014/main" id="{EA3880B3-B1F4-BC57-30C6-420881F35C90}"/>
-              </a:ext>
-            </a:extLst>
-          </p:cNvPr>
-          <p:cNvPicPr>
-            <a:picLocks noChangeAspect="1"/>
-          </p:cNvPicPr>
-          <p:nvPr/>
-        </p:nvPicPr>
-        <p:blipFill>
-          <a:blip r:embed="rId2"/>
-          <a:stretch>
-            <a:fillRect/>
-          </a:stretch>
-        </p:blipFill>
-        <p:spPr>
-          <a:xfrm>
-            <a:off x="10649105" y="458028"/>
-            <a:ext cx="13198448" cy="12799944"/>
-          </a:xfrm>
-          <a:prstGeom prst="rect">
-            <a:avLst/>
-          </a:prstGeom>
-        </p:spPr>
-      </p:pic>
-    </p:spTree>
-    <p:extLst>
-      <p:ext uri="{BB962C8B-B14F-4D97-AF65-F5344CB8AC3E}">
-        <p14:creationId xmlns:p14="http://schemas.microsoft.com/office/powerpoint/2010/main" val="1038884457"/>
-      </p:ext>
-    </p:extLst>
-  </p:cSld>
-  <p:clrMapOvr>
-    <a:masterClrMapping/>
-  </p:clrMapOvr>
-  <p:transition spd="med"/>
-</p:sld>
-</file>
-
-<file path=ppt/slides/slide24.xml><?xml version="1.0" encoding="utf-8"?>
-<p:sld xmlns:a="http://schemas.openxmlformats.org/drawingml/2006/main" xmlns:r="http://schemas.openxmlformats.org/officeDocument/2006/relationships" xmlns:p="http://schemas.openxmlformats.org/presentationml/2006/main">
-  <p:cSld>
-    <p:spTree>
-      <p:nvGrpSpPr>
-        <p:cNvPr id="1" name=""/>
-        <p:cNvGrpSpPr/>
-        <p:nvPr/>
-      </p:nvGrpSpPr>
-      <p:grpSpPr>
-        <a:xfrm>
-          <a:off x="0" y="0"/>
-          <a:ext cx="0" cy="0"/>
-          <a:chOff x="0" y="0"/>
-          <a:chExt cx="0" cy="0"/>
-        </a:xfrm>
-      </p:grpSpPr>
-      <p:sp>
-        <p:nvSpPr>
-          <p:cNvPr id="3" name="Marcador de texto 2">
-            <a:extLst>
-              <a:ext uri="{FF2B5EF4-FFF2-40B4-BE49-F238E27FC236}">
-                <a16:creationId xmlns:a16="http://schemas.microsoft.com/office/drawing/2014/main" id="{AB2A6345-1F5F-05BB-37CA-AF908795463A}"/>
-              </a:ext>
-            </a:extLst>
-          </p:cNvPr>
-          <p:cNvSpPr>
-            <a:spLocks noGrp="1"/>
-          </p:cNvSpPr>
-          <p:nvPr>
-            <p:ph type="body" sz="quarter" idx="14"/>
-          </p:nvPr>
-        </p:nvSpPr>
-        <p:spPr>
-          <a:xfrm>
-            <a:off x="718891" y="835226"/>
-            <a:ext cx="18476383" cy="1398863"/>
-          </a:xfrm>
-        </p:spPr>
-        <p:txBody>
-          <a:bodyPr>
-            <a:normAutofit fontScale="85000" lnSpcReduction="20000"/>
-          </a:bodyPr>
-          <a:lstStyle/>
-          <a:p>
-            <a:r>
-              <a:rPr lang="es-CR" dirty="0">
-                <a:effectLst>
-                  <a:outerShdw blurRad="38100" dist="38100" dir="2700000" algn="tl">
-                    <a:srgbClr val="000000">
-                      <a:alpha val="43137"/>
-                    </a:srgbClr>
-                  </a:outerShdw>
-                </a:effectLst>
-              </a:rPr>
-              <a:t>Corremos el App para probarla</a:t>
-            </a:r>
-          </a:p>
-        </p:txBody>
-      </p:sp>
-      <p:pic>
-        <p:nvPicPr>
-          <p:cNvPr id="5" name="Imagen 4">
-            <a:extLst>
-              <a:ext uri="{FF2B5EF4-FFF2-40B4-BE49-F238E27FC236}">
-                <a16:creationId xmlns:a16="http://schemas.microsoft.com/office/drawing/2014/main" id="{1B9D1552-4B8E-1B2D-855B-C0FAF73E7E59}"/>
-              </a:ext>
-            </a:extLst>
-          </p:cNvPr>
-          <p:cNvPicPr>
-            <a:picLocks noChangeAspect="1"/>
-          </p:cNvPicPr>
-          <p:nvPr/>
-        </p:nvPicPr>
-        <p:blipFill>
-          <a:blip r:embed="rId2"/>
-          <a:stretch>
-            <a:fillRect/>
-          </a:stretch>
-        </p:blipFill>
-        <p:spPr>
-          <a:xfrm>
-            <a:off x="2778724" y="2906156"/>
-            <a:ext cx="18826552" cy="9974618"/>
-          </a:xfrm>
-          <a:prstGeom prst="rect">
-            <a:avLst/>
-          </a:prstGeom>
-        </p:spPr>
-      </p:pic>
-    </p:spTree>
-    <p:extLst>
-      <p:ext uri="{BB962C8B-B14F-4D97-AF65-F5344CB8AC3E}">
-        <p14:creationId xmlns:p14="http://schemas.microsoft.com/office/powerpoint/2010/main" val="2271323880"/>
-      </p:ext>
-    </p:extLst>
-  </p:cSld>
-  <p:clrMapOvr>
-    <a:masterClrMapping/>
-  </p:clrMapOvr>
-  <p:transition spd="med"/>
-</p:sld>
-</file>
-
-<file path=ppt/slides/slide25.xml><?xml version="1.0" encoding="utf-8"?>
-<p:sld xmlns:a="http://schemas.openxmlformats.org/drawingml/2006/main" xmlns:r="http://schemas.openxmlformats.org/officeDocument/2006/relationships" xmlns:p="http://schemas.openxmlformats.org/presentationml/2006/main">
-  <p:cSld>
-    <p:spTree>
-      <p:nvGrpSpPr>
-        <p:cNvPr id="1" name=""/>
-        <p:cNvGrpSpPr/>
-        <p:nvPr/>
-      </p:nvGrpSpPr>
-      <p:grpSpPr>
-        <a:xfrm>
-          <a:off x="0" y="0"/>
-          <a:ext cx="0" cy="0"/>
-          <a:chOff x="0" y="0"/>
-          <a:chExt cx="0" cy="0"/>
-        </a:xfrm>
-      </p:grpSpPr>
-      <p:sp>
-        <p:nvSpPr>
-          <p:cNvPr id="139" name="GRACIAS"/>
-          <p:cNvSpPr>
-            <a:spLocks noGrp="1"/>
-          </p:cNvSpPr>
-          <p:nvPr>
-            <p:ph type="body" idx="13"/>
-          </p:nvPr>
-        </p:nvSpPr>
-        <p:spPr>
-          <a:xfrm>
-            <a:off x="15276812" y="6261100"/>
-            <a:ext cx="6971837" cy="2203252"/>
-          </a:xfrm>
-          <a:prstGeom prst="rect">
-            <a:avLst/>
-          </a:prstGeom>
-        </p:spPr>
-        <p:txBody>
-          <a:bodyPr/>
-          <a:lstStyle/>
-          <a:p>
-            <a:r>
-              <a:rPr dirty="0"/>
-              <a:t>GRACIAS</a:t>
-            </a:r>
-          </a:p>
-        </p:txBody>
-      </p:sp>
-      <p:sp>
-        <p:nvSpPr>
-          <p:cNvPr id="140" name="MUCHAS"/>
-          <p:cNvSpPr>
-            <a:spLocks noGrp="1"/>
-          </p:cNvSpPr>
-          <p:nvPr>
-            <p:ph type="body" idx="14"/>
-          </p:nvPr>
-        </p:nvSpPr>
-        <p:spPr>
-          <a:prstGeom prst="rect">
-            <a:avLst/>
-          </a:prstGeom>
-        </p:spPr>
-        <p:txBody>
-          <a:bodyPr/>
-          <a:lstStyle/>
-          <a:p>
-            <a:r>
-              <a:t>MUCHAS</a:t>
-            </a:r>
-          </a:p>
-        </p:txBody>
-      </p:sp>
-    </p:spTree>
   </p:cSld>
   <p:clrMapOvr>
     <a:masterClrMapping/>
@@ -4347,7 +2563,7 @@
           <p:cNvPr id="3" name="Marcador de texto 2">
             <a:extLst>
               <a:ext uri="{FF2B5EF4-FFF2-40B4-BE49-F238E27FC236}">
-                <a16:creationId xmlns:a16="http://schemas.microsoft.com/office/drawing/2014/main" id="{9731ED87-0DDB-B27F-2DAA-8A0C26F6315E}"/>
+                <a16:creationId xmlns:a16="http://schemas.microsoft.com/office/drawing/2014/main" id="{14D9806A-B499-280C-6610-F15FC40DD218}"/>
               </a:ext>
             </a:extLst>
           </p:cNvPr>
@@ -4360,18 +2576,18 @@
         </p:nvSpPr>
         <p:spPr>
           <a:xfrm>
-            <a:off x="771327" y="832212"/>
-            <a:ext cx="20003841" cy="1910988"/>
+            <a:off x="710522" y="813985"/>
+            <a:ext cx="19991494" cy="1746335"/>
           </a:xfrm>
         </p:spPr>
         <p:txBody>
           <a:bodyPr>
-            <a:normAutofit fontScale="92500" lnSpcReduction="10000"/>
+            <a:normAutofit fontScale="55000" lnSpcReduction="20000"/>
           </a:bodyPr>
           <a:lstStyle/>
           <a:p>
             <a:r>
-              <a:rPr lang="es-CR" sz="6600" dirty="0">
+              <a:rPr lang="es-CR" dirty="0">
                 <a:effectLst>
                   <a:outerShdw blurRad="38100" dist="38100" dir="2700000" algn="tl">
                     <a:srgbClr val="000000">
@@ -4380,12 +2596,12 @@
                   </a:outerShdw>
                 </a:effectLst>
               </a:rPr>
-              <a:t>La ejecutamos para Windows </a:t>
+              <a:t>Agregamos una clase con los métodos CRUD </a:t>
             </a:r>
           </a:p>
           <a:p>
             <a:r>
-              <a:rPr lang="es-CR" sz="6600" dirty="0">
+              <a:rPr lang="es-CR" dirty="0">
                 <a:effectLst>
                   <a:outerShdw blurRad="38100" dist="38100" dir="2700000" algn="tl">
                     <a:srgbClr val="000000">
@@ -4394,75 +2610,41 @@
                   </a:outerShdw>
                 </a:effectLst>
               </a:rPr>
-              <a:t>activando antes el modo para desarrolladores</a:t>
+              <a:t>de la BD en la carpeta </a:t>
+            </a:r>
+            <a:r>
+              <a:rPr lang="es-CR" dirty="0" err="1">
+                <a:effectLst>
+                  <a:outerShdw blurRad="38100" dist="38100" dir="2700000" algn="tl">
+                    <a:srgbClr val="000000">
+                      <a:alpha val="43137"/>
+                    </a:srgbClr>
+                  </a:outerShdw>
+                </a:effectLst>
+              </a:rPr>
+              <a:t>Services</a:t>
+            </a:r>
+            <a:r>
+              <a:rPr lang="es-CR" dirty="0">
+                <a:effectLst>
+                  <a:outerShdw blurRad="38100" dist="38100" dir="2700000" algn="tl">
+                    <a:srgbClr val="000000">
+                      <a:alpha val="43137"/>
+                    </a:srgbClr>
+                  </a:outerShdw>
+                </a:effectLst>
+              </a:rPr>
+              <a:t> </a:t>
             </a:r>
           </a:p>
         </p:txBody>
       </p:sp>
       <p:pic>
         <p:nvPicPr>
-          <p:cNvPr id="5" name="Imagen 4">
-            <a:extLst>
-              <a:ext uri="{FF2B5EF4-FFF2-40B4-BE49-F238E27FC236}">
-                <a16:creationId xmlns:a16="http://schemas.microsoft.com/office/drawing/2014/main" id="{3BCC5EA6-EDC6-CB25-3763-74B972F9A78E}"/>
-              </a:ext>
-            </a:extLst>
-          </p:cNvPr>
-          <p:cNvPicPr>
-            <a:picLocks noChangeAspect="1"/>
-          </p:cNvPicPr>
-          <p:nvPr/>
-        </p:nvPicPr>
-        <p:blipFill rotWithShape="1">
-          <a:blip r:embed="rId2"/>
-          <a:srcRect t="12358"/>
-          <a:stretch/>
-        </p:blipFill>
-        <p:spPr>
-          <a:xfrm>
-            <a:off x="771327" y="9106963"/>
-            <a:ext cx="19233202" cy="3396462"/>
-          </a:xfrm>
-          <a:prstGeom prst="rect">
-            <a:avLst/>
-          </a:prstGeom>
-        </p:spPr>
-      </p:pic>
-      <p:pic>
-        <p:nvPicPr>
           <p:cNvPr id="7" name="Imagen 6">
             <a:extLst>
               <a:ext uri="{FF2B5EF4-FFF2-40B4-BE49-F238E27FC236}">
-                <a16:creationId xmlns:a16="http://schemas.microsoft.com/office/drawing/2014/main" id="{461BE72F-A24D-2DC5-0576-61BF9F1EAA59}"/>
-              </a:ext>
-            </a:extLst>
-          </p:cNvPr>
-          <p:cNvPicPr>
-            <a:picLocks noChangeAspect="1"/>
-          </p:cNvPicPr>
-          <p:nvPr/>
-        </p:nvPicPr>
-        <p:blipFill rotWithShape="1">
-          <a:blip r:embed="rId3"/>
-          <a:srcRect r="6784" b="11910"/>
-          <a:stretch/>
-        </p:blipFill>
-        <p:spPr>
-          <a:xfrm>
-            <a:off x="11217426" y="3461537"/>
-            <a:ext cx="12395247" cy="4768063"/>
-          </a:xfrm>
-          <a:prstGeom prst="rect">
-            <a:avLst/>
-          </a:prstGeom>
-        </p:spPr>
-      </p:pic>
-      <p:pic>
-        <p:nvPicPr>
-          <p:cNvPr id="9" name="Imagen 8">
-            <a:extLst>
-              <a:ext uri="{FF2B5EF4-FFF2-40B4-BE49-F238E27FC236}">
-                <a16:creationId xmlns:a16="http://schemas.microsoft.com/office/drawing/2014/main" id="{D5460321-5228-D1AD-C31F-D9FD7258BA03}"/>
+                <a16:creationId xmlns:a16="http://schemas.microsoft.com/office/drawing/2014/main" id="{005BF44C-19EA-54EC-FB33-2FAA84DEA8AE}"/>
               </a:ext>
             </a:extLst>
           </p:cNvPr>
@@ -4472,15 +2654,15 @@
           <p:nvPr/>
         </p:nvPicPr>
         <p:blipFill>
-          <a:blip r:embed="rId4"/>
+          <a:blip r:embed="rId2"/>
           <a:stretch>
             <a:fillRect/>
           </a:stretch>
         </p:blipFill>
         <p:spPr>
           <a:xfrm>
-            <a:off x="771327" y="3461537"/>
-            <a:ext cx="9712357" cy="3396463"/>
+            <a:off x="1862323" y="3310128"/>
+            <a:ext cx="20659353" cy="9900897"/>
           </a:xfrm>
           <a:prstGeom prst="rect">
             <a:avLst/>
@@ -4490,7 +2672,7 @@
     </p:spTree>
     <p:extLst>
       <p:ext uri="{BB962C8B-B14F-4D97-AF65-F5344CB8AC3E}">
-        <p14:creationId xmlns:p14="http://schemas.microsoft.com/office/powerpoint/2010/main" val="2360713989"/>
+        <p14:creationId xmlns:p14="http://schemas.microsoft.com/office/powerpoint/2010/main" val="2339863510"/>
       </p:ext>
     </p:extLst>
   </p:cSld>
@@ -4523,7 +2705,7 @@
           <p:cNvPr id="3" name="Marcador de texto 2">
             <a:extLst>
               <a:ext uri="{FF2B5EF4-FFF2-40B4-BE49-F238E27FC236}">
-                <a16:creationId xmlns:a16="http://schemas.microsoft.com/office/drawing/2014/main" id="{22EE5D9A-60F4-74F0-BAF1-91BEDBFF717F}"/>
+                <a16:creationId xmlns:a16="http://schemas.microsoft.com/office/drawing/2014/main" id="{BA161994-0B9C-9FF3-DF31-AD6F87E9E73D}"/>
               </a:ext>
             </a:extLst>
           </p:cNvPr>
@@ -4536,18 +2718,18 @@
         </p:nvSpPr>
         <p:spPr>
           <a:xfrm>
-            <a:off x="828997" y="820346"/>
-            <a:ext cx="18476383" cy="2203252"/>
+            <a:off x="673946" y="482153"/>
+            <a:ext cx="19497718" cy="2203252"/>
           </a:xfrm>
         </p:spPr>
         <p:txBody>
           <a:bodyPr>
-            <a:normAutofit fontScale="92500"/>
+            <a:normAutofit fontScale="62500" lnSpcReduction="20000"/>
           </a:bodyPr>
           <a:lstStyle/>
           <a:p>
             <a:r>
-              <a:rPr lang="es-CR" sz="8000" dirty="0">
+              <a:rPr lang="es-CR" dirty="0">
                 <a:effectLst>
                   <a:outerShdw blurRad="38100" dist="38100" dir="2700000" algn="tl">
                     <a:srgbClr val="000000">
@@ -4556,8 +2738,53 @@
                   </a:outerShdw>
                 </a:effectLst>
               </a:rPr>
-              <a:t>Nos preparamos para ejecutarla para Android</a:t>
+              <a:t>La estructura de página </a:t>
             </a:r>
+            <a:r>
+              <a:rPr lang="es-CR" dirty="0" err="1">
+                <a:effectLst>
+                  <a:outerShdw blurRad="38100" dist="38100" dir="2700000" algn="tl">
+                    <a:srgbClr val="000000">
+                      <a:alpha val="43137"/>
+                    </a:srgbClr>
+                  </a:outerShdw>
+                </a:effectLst>
+              </a:rPr>
+              <a:t>Razor</a:t>
+            </a:r>
+            <a:r>
+              <a:rPr lang="es-CR" dirty="0">
+                <a:effectLst>
+                  <a:outerShdw blurRad="38100" dist="38100" dir="2700000" algn="tl">
+                    <a:srgbClr val="000000">
+                      <a:alpha val="43137"/>
+                    </a:srgbClr>
+                  </a:outerShdw>
+                </a:effectLst>
+              </a:rPr>
+              <a:t> queda prácticamente igual, solo se invocan las clases en los </a:t>
+            </a:r>
+            <a:r>
+              <a:rPr lang="es-CR" dirty="0" err="1">
+                <a:effectLst>
+                  <a:outerShdw blurRad="38100" dist="38100" dir="2700000" algn="tl">
+                    <a:srgbClr val="000000">
+                      <a:alpha val="43137"/>
+                    </a:srgbClr>
+                  </a:outerShdw>
+                </a:effectLst>
+              </a:rPr>
+              <a:t>usings</a:t>
+            </a:r>
+            <a:endParaRPr lang="es-CR" dirty="0">
+              <a:effectLst>
+                <a:outerShdw blurRad="38100" dist="38100" dir="2700000" algn="tl">
+                  <a:srgbClr val="000000">
+                    <a:alpha val="43137"/>
+                  </a:srgbClr>
+                </a:outerShdw>
+              </a:effectLst>
+            </a:endParaRPr>
           </a:p>
         </p:txBody>
       </p:sp>
@@ -4566,7 +2793,7 @@
           <p:cNvPr id="5" name="Imagen 4">
             <a:extLst>
               <a:ext uri="{FF2B5EF4-FFF2-40B4-BE49-F238E27FC236}">
-                <a16:creationId xmlns:a16="http://schemas.microsoft.com/office/drawing/2014/main" id="{DDEB69F3-BC4D-6F18-C1E5-E69743CEEC4C}"/>
+                <a16:creationId xmlns:a16="http://schemas.microsoft.com/office/drawing/2014/main" id="{A2267EAF-512B-88B9-8319-2D259BC8D496}"/>
               </a:ext>
             </a:extLst>
           </p:cNvPr>
@@ -4583,99 +2810,8 @@
         </p:blipFill>
         <p:spPr>
           <a:xfrm>
-            <a:off x="3326647" y="3598534"/>
-            <a:ext cx="17730706" cy="9063919"/>
-          </a:xfrm>
-          <a:prstGeom prst="rect">
-            <a:avLst/>
-          </a:prstGeom>
-        </p:spPr>
-      </p:pic>
-    </p:spTree>
-    <p:extLst>
-      <p:ext uri="{BB962C8B-B14F-4D97-AF65-F5344CB8AC3E}">
-        <p14:creationId xmlns:p14="http://schemas.microsoft.com/office/powerpoint/2010/main" val="233973766"/>
-      </p:ext>
-    </p:extLst>
-  </p:cSld>
-  <p:clrMapOvr>
-    <a:masterClrMapping/>
-  </p:clrMapOvr>
-  <p:transition spd="med"/>
-</p:sld>
-</file>
-
-<file path=ppt/slides/slide5.xml><?xml version="1.0" encoding="utf-8"?>
-<p:sld xmlns:a="http://schemas.openxmlformats.org/drawingml/2006/main" xmlns:r="http://schemas.openxmlformats.org/officeDocument/2006/relationships" xmlns:p="http://schemas.openxmlformats.org/presentationml/2006/main">
-  <p:cSld>
-    <p:spTree>
-      <p:nvGrpSpPr>
-        <p:cNvPr id="1" name=""/>
-        <p:cNvGrpSpPr/>
-        <p:nvPr/>
-      </p:nvGrpSpPr>
-      <p:grpSpPr>
-        <a:xfrm>
-          <a:off x="0" y="0"/>
-          <a:ext cx="0" cy="0"/>
-          <a:chOff x="0" y="0"/>
-          <a:chExt cx="0" cy="0"/>
-        </a:xfrm>
-      </p:grpSpPr>
-      <p:pic>
-        <p:nvPicPr>
-          <p:cNvPr id="5" name="Imagen 4">
-            <a:extLst>
-              <a:ext uri="{FF2B5EF4-FFF2-40B4-BE49-F238E27FC236}">
-                <a16:creationId xmlns:a16="http://schemas.microsoft.com/office/drawing/2014/main" id="{2FB04EB4-833D-A55A-2AFA-14EC061A4A18}"/>
-              </a:ext>
-            </a:extLst>
-          </p:cNvPr>
-          <p:cNvPicPr>
-            <a:picLocks noChangeAspect="1"/>
-          </p:cNvPicPr>
-          <p:nvPr/>
-        </p:nvPicPr>
-        <p:blipFill>
-          <a:blip r:embed="rId2"/>
-          <a:stretch>
-            <a:fillRect/>
-          </a:stretch>
-        </p:blipFill>
-        <p:spPr>
-          <a:xfrm>
-            <a:off x="430836" y="4068825"/>
-            <a:ext cx="10416809" cy="8196062"/>
-          </a:xfrm>
-          <a:prstGeom prst="rect">
-            <a:avLst/>
-          </a:prstGeom>
-        </p:spPr>
-      </p:pic>
-      <p:pic>
-        <p:nvPicPr>
-          <p:cNvPr id="9" name="Imagen 8">
-            <a:extLst>
-              <a:ext uri="{FF2B5EF4-FFF2-40B4-BE49-F238E27FC236}">
-                <a16:creationId xmlns:a16="http://schemas.microsoft.com/office/drawing/2014/main" id="{EFFCCA5D-41A2-6A3D-9FAA-9E3D836E6A9C}"/>
-              </a:ext>
-            </a:extLst>
-          </p:cNvPr>
-          <p:cNvPicPr>
-            <a:picLocks noChangeAspect="1"/>
-          </p:cNvPicPr>
-          <p:nvPr/>
-        </p:nvPicPr>
-        <p:blipFill>
-          <a:blip r:embed="rId3"/>
-          <a:stretch>
-            <a:fillRect/>
-          </a:stretch>
-        </p:blipFill>
-        <p:spPr>
-          <a:xfrm>
-            <a:off x="11476704" y="4068825"/>
-            <a:ext cx="12277678" cy="8196061"/>
+            <a:off x="822231" y="3179181"/>
+            <a:ext cx="12802329" cy="10286172"/>
           </a:xfrm>
           <a:prstGeom prst="rect">
             <a:avLst/>
@@ -4684,10 +2820,10 @@
       </p:pic>
       <p:sp>
         <p:nvSpPr>
-          <p:cNvPr id="2" name="Marcador de texto 2">
+          <p:cNvPr id="6" name="Title Text">
             <a:extLst>
               <a:ext uri="{FF2B5EF4-FFF2-40B4-BE49-F238E27FC236}">
-                <a16:creationId xmlns:a16="http://schemas.microsoft.com/office/drawing/2014/main" id="{1AE32536-78D9-BAA0-5237-0F0C3A2B98AA}"/>
+                <a16:creationId xmlns:a16="http://schemas.microsoft.com/office/drawing/2014/main" id="{99297BDA-C760-9619-095E-9F52262729E3}"/>
               </a:ext>
             </a:extLst>
           </p:cNvPr>
@@ -4698,8 +2834,8 @@
         </p:nvSpPr>
         <p:spPr>
           <a:xfrm>
-            <a:off x="828997" y="820346"/>
-            <a:ext cx="19367316" cy="2203252"/>
+            <a:off x="14100048" y="3179181"/>
+            <a:ext cx="7805631" cy="3535680"/>
           </a:xfrm>
           <a:prstGeom prst="rect">
             <a:avLst/>
@@ -4709,13 +2845,13 @@
           </a:ln>
           <a:extLst>
             <a:ext uri="{C572A759-6A51-4108-AA02-DFA0A04FC94B}">
-              <ma14:wrappingTextBoxFlag xmlns="" xmlns:ma14="http://schemas.microsoft.com/office/mac/drawingml/2011/main" val="1"/>
+              <ma14:wrappingTextBoxFlag xmlns:ma14="http://schemas.microsoft.com/office/mac/drawingml/2011/main" xmlns="" val="1"/>
             </a:ext>
           </a:extLst>
         </p:spPr>
         <p:txBody>
           <a:bodyPr lIns="50800" tIns="50800" rIns="50800" bIns="50800" anchor="ctr">
-            <a:normAutofit fontScale="92500"/>
+            <a:normAutofit fontScale="32500" lnSpcReduction="20000"/>
           </a:bodyPr>
           <a:lstStyle>
             <a:lvl1pPr marL="0" marR="0" indent="0" algn="l" defTabSz="825500" rtl="0" latinLnBrk="0">
@@ -4983,24 +3119,165 @@
           <a:p>
             <a:pPr hangingPunct="1"/>
             <a:r>
-              <a:rPr lang="es-CR" sz="8000" dirty="0">
-                <a:effectLst>
-                  <a:outerShdw blurRad="38100" dist="38100" dir="2700000" algn="tl">
-                    <a:srgbClr val="000000">
-                      <a:alpha val="43137"/>
-                    </a:srgbClr>
-                  </a:outerShdw>
-                </a:effectLst>
+              <a:rPr lang="es-CR" sz="11800" dirty="0">
+                <a:solidFill>
+                  <a:schemeClr val="bg1"/>
+                </a:solidFill>
               </a:rPr>
-              <a:t>Nos preparamos para ejecutarla para Android #2</a:t>
+              <a:t>Se necesitan los siguientes </a:t>
             </a:r>
+            <a:r>
+              <a:rPr lang="es-CR" sz="11800" dirty="0" err="1">
+                <a:solidFill>
+                  <a:schemeClr val="bg1"/>
+                </a:solidFill>
+              </a:rPr>
+              <a:t>nuGets</a:t>
+            </a:r>
+            <a:r>
+              <a:rPr lang="es-CR" sz="11800" dirty="0">
+                <a:solidFill>
+                  <a:schemeClr val="bg1"/>
+                </a:solidFill>
+              </a:rPr>
+              <a:t>:</a:t>
+            </a:r>
+          </a:p>
+          <a:p>
+            <a:pPr hangingPunct="1"/>
+            <a:endParaRPr lang="es-CR" sz="11800" dirty="0">
+              <a:solidFill>
+                <a:schemeClr val="bg1"/>
+              </a:solidFill>
+            </a:endParaRPr>
+          </a:p>
+          <a:p>
+            <a:pPr hangingPunct="1"/>
+            <a:r>
+              <a:rPr lang="es-CR" sz="11800" dirty="0" err="1">
+                <a:solidFill>
+                  <a:schemeClr val="bg1"/>
+                </a:solidFill>
+              </a:rPr>
+              <a:t>sqlite</a:t>
+            </a:r>
+            <a:r>
+              <a:rPr lang="es-CR" sz="11800" dirty="0">
+                <a:solidFill>
+                  <a:schemeClr val="bg1"/>
+                </a:solidFill>
+              </a:rPr>
+              <a:t>-net-</a:t>
+            </a:r>
+            <a:r>
+              <a:rPr lang="es-CR" sz="11800" dirty="0" err="1">
+                <a:solidFill>
+                  <a:schemeClr val="bg1"/>
+                </a:solidFill>
+              </a:rPr>
+              <a:t>pcl</a:t>
+            </a:r>
+            <a:endParaRPr lang="es-CR" sz="11800" dirty="0">
+              <a:solidFill>
+                <a:schemeClr val="bg1"/>
+              </a:solidFill>
+            </a:endParaRPr>
+          </a:p>
+          <a:p>
+            <a:pPr hangingPunct="1"/>
+            <a:r>
+              <a:rPr lang="es-CR" sz="11800" dirty="0" err="1">
+                <a:solidFill>
+                  <a:schemeClr val="bg1"/>
+                </a:solidFill>
+              </a:rPr>
+              <a:t>SQLitePCLRaw.core</a:t>
+            </a:r>
+            <a:endParaRPr lang="es-CR" sz="11800" dirty="0">
+              <a:solidFill>
+                <a:schemeClr val="bg1"/>
+              </a:solidFill>
+            </a:endParaRPr>
+          </a:p>
+          <a:p>
+            <a:pPr hangingPunct="1"/>
+            <a:r>
+              <a:rPr lang="es-CR" sz="11800" dirty="0" err="1">
+                <a:solidFill>
+                  <a:schemeClr val="bg1"/>
+                </a:solidFill>
+              </a:rPr>
+              <a:t>SQLitePCLRaw.bundle_green</a:t>
+            </a:r>
+            <a:endParaRPr lang="es-CR" sz="11800" dirty="0">
+              <a:solidFill>
+                <a:schemeClr val="bg1"/>
+              </a:solidFill>
+            </a:endParaRPr>
+          </a:p>
+          <a:p>
+            <a:pPr hangingPunct="1"/>
+            <a:r>
+              <a:rPr lang="es-CR" sz="11800" dirty="0">
+                <a:solidFill>
+                  <a:schemeClr val="bg1"/>
+                </a:solidFill>
+              </a:rPr>
+              <a:t>SQLitePCLRaw.provider.sqlite3</a:t>
+            </a:r>
+          </a:p>
+          <a:p>
+            <a:pPr hangingPunct="1"/>
+            <a:r>
+              <a:rPr lang="es-CR" sz="11800" dirty="0" err="1">
+                <a:solidFill>
+                  <a:schemeClr val="bg1"/>
+                </a:solidFill>
+              </a:rPr>
+              <a:t>SQLitePCLRaw.provider.dynamic_cdecl</a:t>
+            </a:r>
+            <a:endParaRPr lang="es-CR" sz="11800" dirty="0">
+              <a:solidFill>
+                <a:schemeClr val="bg1"/>
+              </a:solidFill>
+            </a:endParaRPr>
           </a:p>
         </p:txBody>
       </p:sp>
+      <p:pic>
+        <p:nvPicPr>
+          <p:cNvPr id="8" name="Imagen 7">
+            <a:extLst>
+              <a:ext uri="{FF2B5EF4-FFF2-40B4-BE49-F238E27FC236}">
+                <a16:creationId xmlns:a16="http://schemas.microsoft.com/office/drawing/2014/main" id="{5E9ACD3F-BFF9-A470-2E02-893CAEB03536}"/>
+              </a:ext>
+            </a:extLst>
+          </p:cNvPr>
+          <p:cNvPicPr>
+            <a:picLocks noChangeAspect="1"/>
+          </p:cNvPicPr>
+          <p:nvPr/>
+        </p:nvPicPr>
+        <p:blipFill>
+          <a:blip r:embed="rId3"/>
+          <a:stretch>
+            <a:fillRect/>
+          </a:stretch>
+        </p:blipFill>
+        <p:spPr>
+          <a:xfrm>
+            <a:off x="13917168" y="7383859"/>
+            <a:ext cx="10290064" cy="6081494"/>
+          </a:xfrm>
+          <a:prstGeom prst="rect">
+            <a:avLst/>
+          </a:prstGeom>
+        </p:spPr>
+      </p:pic>
     </p:spTree>
     <p:extLst>
       <p:ext uri="{BB962C8B-B14F-4D97-AF65-F5344CB8AC3E}">
-        <p14:creationId xmlns:p14="http://schemas.microsoft.com/office/powerpoint/2010/main" val="3002412377"/>
+        <p14:creationId xmlns:p14="http://schemas.microsoft.com/office/powerpoint/2010/main" val="1484484288"/>
       </p:ext>
     </p:extLst>
   </p:cSld>
@@ -5011,382 +3288,7 @@
 </p:sld>
 </file>
 
-<file path=ppt/slides/slide6.xml><?xml version="1.0" encoding="utf-8"?>
-<p:sld xmlns:a="http://schemas.openxmlformats.org/drawingml/2006/main" xmlns:r="http://schemas.openxmlformats.org/officeDocument/2006/relationships" xmlns:p="http://schemas.openxmlformats.org/presentationml/2006/main">
-  <p:cSld>
-    <p:spTree>
-      <p:nvGrpSpPr>
-        <p:cNvPr id="1" name=""/>
-        <p:cNvGrpSpPr/>
-        <p:nvPr/>
-      </p:nvGrpSpPr>
-      <p:grpSpPr>
-        <a:xfrm>
-          <a:off x="0" y="0"/>
-          <a:ext cx="0" cy="0"/>
-          <a:chOff x="0" y="0"/>
-          <a:chExt cx="0" cy="0"/>
-        </a:xfrm>
-      </p:grpSpPr>
-      <p:pic>
-        <p:nvPicPr>
-          <p:cNvPr id="7" name="Imagen 6">
-            <a:extLst>
-              <a:ext uri="{FF2B5EF4-FFF2-40B4-BE49-F238E27FC236}">
-                <a16:creationId xmlns:a16="http://schemas.microsoft.com/office/drawing/2014/main" id="{76296432-946C-AB7F-7908-4AC79E4F493D}"/>
-              </a:ext>
-            </a:extLst>
-          </p:cNvPr>
-          <p:cNvPicPr>
-            <a:picLocks noChangeAspect="1"/>
-          </p:cNvPicPr>
-          <p:nvPr/>
-        </p:nvPicPr>
-        <p:blipFill rotWithShape="1">
-          <a:blip r:embed="rId2"/>
-          <a:srcRect b="38705"/>
-          <a:stretch/>
-        </p:blipFill>
-        <p:spPr>
-          <a:xfrm>
-            <a:off x="1384003" y="4079646"/>
-            <a:ext cx="21615993" cy="8304510"/>
-          </a:xfrm>
-          <a:prstGeom prst="rect">
-            <a:avLst/>
-          </a:prstGeom>
-        </p:spPr>
-      </p:pic>
-      <p:sp>
-        <p:nvSpPr>
-          <p:cNvPr id="2" name="Marcador de texto 2">
-            <a:extLst>
-              <a:ext uri="{FF2B5EF4-FFF2-40B4-BE49-F238E27FC236}">
-                <a16:creationId xmlns:a16="http://schemas.microsoft.com/office/drawing/2014/main" id="{26CD38C0-F536-844F-F305-8499A2A75312}"/>
-              </a:ext>
-            </a:extLst>
-          </p:cNvPr>
-          <p:cNvSpPr txBox="1">
-            <a:spLocks/>
-          </p:cNvSpPr>
-          <p:nvPr/>
-        </p:nvSpPr>
-        <p:spPr>
-          <a:xfrm>
-            <a:off x="749484" y="820346"/>
-            <a:ext cx="19566099" cy="1724071"/>
-          </a:xfrm>
-          <a:prstGeom prst="rect">
-            <a:avLst/>
-          </a:prstGeom>
-          <a:ln w="12700">
-            <a:miter lim="400000"/>
-          </a:ln>
-          <a:extLst>
-            <a:ext uri="{C572A759-6A51-4108-AA02-DFA0A04FC94B}">
-              <ma14:wrappingTextBoxFlag xmlns="" xmlns:ma14="http://schemas.microsoft.com/office/mac/drawingml/2011/main" val="1"/>
-            </a:ext>
-          </a:extLst>
-        </p:spPr>
-        <p:txBody>
-          <a:bodyPr lIns="50800" tIns="50800" rIns="50800" bIns="50800" anchor="ctr">
-            <a:normAutofit fontScale="92500"/>
-          </a:bodyPr>
-          <a:lstStyle>
-            <a:lvl1pPr marL="0" marR="0" indent="0" algn="l" defTabSz="825500" rtl="0" latinLnBrk="0">
-              <a:lnSpc>
-                <a:spcPct val="100000"/>
-              </a:lnSpc>
-              <a:spcBef>
-                <a:spcPts val="0"/>
-              </a:spcBef>
-              <a:spcAft>
-                <a:spcPts val="0"/>
-              </a:spcAft>
-              <a:buClrTx/>
-              <a:buSzTx/>
-              <a:buFontTx/>
-              <a:buNone/>
-              <a:tabLst/>
-              <a:defRPr sz="11200" b="0" i="0" u="none" strike="noStrike" cap="none" spc="0" baseline="0">
-                <a:ln>
-                  <a:noFill/>
-                </a:ln>
-                <a:solidFill>
-                  <a:srgbClr val="F4D15C"/>
-                </a:solidFill>
-                <a:uFillTx/>
-                <a:latin typeface="Abrade-Black"/>
-                <a:ea typeface="Abrade-Black"/>
-                <a:cs typeface="Abrade-Black"/>
-                <a:sym typeface="Abrade-Black"/>
-              </a:defRPr>
-            </a:lvl1pPr>
-            <a:lvl2pPr marL="1270000" marR="0" indent="-635000" algn="l" defTabSz="825500" rtl="0" latinLnBrk="0">
-              <a:lnSpc>
-                <a:spcPct val="100000"/>
-              </a:lnSpc>
-              <a:spcBef>
-                <a:spcPts val="5900"/>
-              </a:spcBef>
-              <a:spcAft>
-                <a:spcPts val="0"/>
-              </a:spcAft>
-              <a:buClrTx/>
-              <a:buSzPct val="75000"/>
-              <a:buFontTx/>
-              <a:buChar char="•"/>
-              <a:tabLst/>
-              <a:defRPr sz="5200" b="0" i="0" u="none" strike="noStrike" cap="none" spc="0" baseline="0">
-                <a:ln>
-                  <a:noFill/>
-                </a:ln>
-                <a:solidFill>
-                  <a:srgbClr val="FFFFFF"/>
-                </a:solidFill>
-                <a:uFillTx/>
-                <a:latin typeface="+mn-lt"/>
-                <a:ea typeface="+mn-ea"/>
-                <a:cs typeface="+mn-cs"/>
-                <a:sym typeface="Helvetica Light"/>
-              </a:defRPr>
-            </a:lvl2pPr>
-            <a:lvl3pPr marL="1905000" marR="0" indent="-635000" algn="l" defTabSz="825500" rtl="0" latinLnBrk="0">
-              <a:lnSpc>
-                <a:spcPct val="100000"/>
-              </a:lnSpc>
-              <a:spcBef>
-                <a:spcPts val="5900"/>
-              </a:spcBef>
-              <a:spcAft>
-                <a:spcPts val="0"/>
-              </a:spcAft>
-              <a:buClrTx/>
-              <a:buSzPct val="75000"/>
-              <a:buFontTx/>
-              <a:buChar char="•"/>
-              <a:tabLst/>
-              <a:defRPr sz="5200" b="0" i="0" u="none" strike="noStrike" cap="none" spc="0" baseline="0">
-                <a:ln>
-                  <a:noFill/>
-                </a:ln>
-                <a:solidFill>
-                  <a:srgbClr val="FFFFFF"/>
-                </a:solidFill>
-                <a:uFillTx/>
-                <a:latin typeface="+mn-lt"/>
-                <a:ea typeface="+mn-ea"/>
-                <a:cs typeface="+mn-cs"/>
-                <a:sym typeface="Helvetica Light"/>
-              </a:defRPr>
-            </a:lvl3pPr>
-            <a:lvl4pPr marL="2540000" marR="0" indent="-635000" algn="l" defTabSz="825500" rtl="0" latinLnBrk="0">
-              <a:lnSpc>
-                <a:spcPct val="100000"/>
-              </a:lnSpc>
-              <a:spcBef>
-                <a:spcPts val="5900"/>
-              </a:spcBef>
-              <a:spcAft>
-                <a:spcPts val="0"/>
-              </a:spcAft>
-              <a:buClrTx/>
-              <a:buSzPct val="75000"/>
-              <a:buFontTx/>
-              <a:buChar char="•"/>
-              <a:tabLst/>
-              <a:defRPr sz="5200" b="0" i="0" u="none" strike="noStrike" cap="none" spc="0" baseline="0">
-                <a:ln>
-                  <a:noFill/>
-                </a:ln>
-                <a:solidFill>
-                  <a:srgbClr val="FFFFFF"/>
-                </a:solidFill>
-                <a:uFillTx/>
-                <a:latin typeface="+mn-lt"/>
-                <a:ea typeface="+mn-ea"/>
-                <a:cs typeface="+mn-cs"/>
-                <a:sym typeface="Helvetica Light"/>
-              </a:defRPr>
-            </a:lvl4pPr>
-            <a:lvl5pPr marL="3175000" marR="0" indent="-635000" algn="l" defTabSz="825500" rtl="0" latinLnBrk="0">
-              <a:lnSpc>
-                <a:spcPct val="100000"/>
-              </a:lnSpc>
-              <a:spcBef>
-                <a:spcPts val="5900"/>
-              </a:spcBef>
-              <a:spcAft>
-                <a:spcPts val="0"/>
-              </a:spcAft>
-              <a:buClrTx/>
-              <a:buSzPct val="75000"/>
-              <a:buFontTx/>
-              <a:buChar char="•"/>
-              <a:tabLst/>
-              <a:defRPr sz="5200" b="0" i="0" u="none" strike="noStrike" cap="none" spc="0" baseline="0">
-                <a:ln>
-                  <a:noFill/>
-                </a:ln>
-                <a:solidFill>
-                  <a:srgbClr val="FFFFFF"/>
-                </a:solidFill>
-                <a:uFillTx/>
-                <a:latin typeface="+mn-lt"/>
-                <a:ea typeface="+mn-ea"/>
-                <a:cs typeface="+mn-cs"/>
-                <a:sym typeface="Helvetica Light"/>
-              </a:defRPr>
-            </a:lvl5pPr>
-            <a:lvl6pPr marL="3810000" marR="0" indent="-635000" algn="l" defTabSz="825500" rtl="0" latinLnBrk="0">
-              <a:lnSpc>
-                <a:spcPct val="100000"/>
-              </a:lnSpc>
-              <a:spcBef>
-                <a:spcPts val="5900"/>
-              </a:spcBef>
-              <a:spcAft>
-                <a:spcPts val="0"/>
-              </a:spcAft>
-              <a:buClrTx/>
-              <a:buSzPct val="75000"/>
-              <a:buFontTx/>
-              <a:buChar char="•"/>
-              <a:tabLst/>
-              <a:defRPr sz="5200" b="0" i="0" u="none" strike="noStrike" cap="none" spc="0" baseline="0">
-                <a:ln>
-                  <a:noFill/>
-                </a:ln>
-                <a:solidFill>
-                  <a:srgbClr val="FFFFFF"/>
-                </a:solidFill>
-                <a:uFillTx/>
-                <a:latin typeface="+mn-lt"/>
-                <a:ea typeface="+mn-ea"/>
-                <a:cs typeface="+mn-cs"/>
-                <a:sym typeface="Helvetica Light"/>
-              </a:defRPr>
-            </a:lvl6pPr>
-            <a:lvl7pPr marL="4445000" marR="0" indent="-635000" algn="l" defTabSz="825500" rtl="0" latinLnBrk="0">
-              <a:lnSpc>
-                <a:spcPct val="100000"/>
-              </a:lnSpc>
-              <a:spcBef>
-                <a:spcPts val="5900"/>
-              </a:spcBef>
-              <a:spcAft>
-                <a:spcPts val="0"/>
-              </a:spcAft>
-              <a:buClrTx/>
-              <a:buSzPct val="75000"/>
-              <a:buFontTx/>
-              <a:buChar char="•"/>
-              <a:tabLst/>
-              <a:defRPr sz="5200" b="0" i="0" u="none" strike="noStrike" cap="none" spc="0" baseline="0">
-                <a:ln>
-                  <a:noFill/>
-                </a:ln>
-                <a:solidFill>
-                  <a:srgbClr val="FFFFFF"/>
-                </a:solidFill>
-                <a:uFillTx/>
-                <a:latin typeface="+mn-lt"/>
-                <a:ea typeface="+mn-ea"/>
-                <a:cs typeface="+mn-cs"/>
-                <a:sym typeface="Helvetica Light"/>
-              </a:defRPr>
-            </a:lvl7pPr>
-            <a:lvl8pPr marL="5080000" marR="0" indent="-635000" algn="l" defTabSz="825500" rtl="0" latinLnBrk="0">
-              <a:lnSpc>
-                <a:spcPct val="100000"/>
-              </a:lnSpc>
-              <a:spcBef>
-                <a:spcPts val="5900"/>
-              </a:spcBef>
-              <a:spcAft>
-                <a:spcPts val="0"/>
-              </a:spcAft>
-              <a:buClrTx/>
-              <a:buSzPct val="75000"/>
-              <a:buFontTx/>
-              <a:buChar char="•"/>
-              <a:tabLst/>
-              <a:defRPr sz="5200" b="0" i="0" u="none" strike="noStrike" cap="none" spc="0" baseline="0">
-                <a:ln>
-                  <a:noFill/>
-                </a:ln>
-                <a:solidFill>
-                  <a:srgbClr val="FFFFFF"/>
-                </a:solidFill>
-                <a:uFillTx/>
-                <a:latin typeface="+mn-lt"/>
-                <a:ea typeface="+mn-ea"/>
-                <a:cs typeface="+mn-cs"/>
-                <a:sym typeface="Helvetica Light"/>
-              </a:defRPr>
-            </a:lvl8pPr>
-            <a:lvl9pPr marL="5715000" marR="0" indent="-635000" algn="l" defTabSz="825500" rtl="0" latinLnBrk="0">
-              <a:lnSpc>
-                <a:spcPct val="100000"/>
-              </a:lnSpc>
-              <a:spcBef>
-                <a:spcPts val="5900"/>
-              </a:spcBef>
-              <a:spcAft>
-                <a:spcPts val="0"/>
-              </a:spcAft>
-              <a:buClrTx/>
-              <a:buSzPct val="75000"/>
-              <a:buFontTx/>
-              <a:buChar char="•"/>
-              <a:tabLst/>
-              <a:defRPr sz="5200" b="0" i="0" u="none" strike="noStrike" cap="none" spc="0" baseline="0">
-                <a:ln>
-                  <a:noFill/>
-                </a:ln>
-                <a:solidFill>
-                  <a:srgbClr val="FFFFFF"/>
-                </a:solidFill>
-                <a:uFillTx/>
-                <a:latin typeface="+mn-lt"/>
-                <a:ea typeface="+mn-ea"/>
-                <a:cs typeface="+mn-cs"/>
-                <a:sym typeface="Helvetica Light"/>
-              </a:defRPr>
-            </a:lvl9pPr>
-          </a:lstStyle>
-          <a:p>
-            <a:pPr hangingPunct="1"/>
-            <a:r>
-              <a:rPr lang="es-CR" sz="8000" dirty="0">
-                <a:effectLst>
-                  <a:outerShdw blurRad="38100" dist="38100" dir="2700000" algn="tl">
-                    <a:srgbClr val="000000">
-                      <a:alpha val="43137"/>
-                    </a:srgbClr>
-                  </a:outerShdw>
-                </a:effectLst>
-              </a:rPr>
-              <a:t>Nos preparamos para ejecutarla para Android #3</a:t>
-            </a:r>
-          </a:p>
-        </p:txBody>
-      </p:sp>
-    </p:spTree>
-    <p:extLst>
-      <p:ext uri="{BB962C8B-B14F-4D97-AF65-F5344CB8AC3E}">
-        <p14:creationId xmlns:p14="http://schemas.microsoft.com/office/powerpoint/2010/main" val="2955004541"/>
-      </p:ext>
-    </p:extLst>
-  </p:cSld>
-  <p:clrMapOvr>
-    <a:masterClrMapping/>
-  </p:clrMapOvr>
-  <p:transition spd="med"/>
-</p:sld>
-</file>
-
-<file path=ppt/slides/slide7.xml><?xml version="1.0" encoding="utf-8"?>
+<file path=ppt/slides/slide5.xml><?xml version="1.0" encoding="utf-8"?>
 <p:sld xmlns:a="http://schemas.openxmlformats.org/drawingml/2006/main" xmlns:r="http://schemas.openxmlformats.org/officeDocument/2006/relationships" xmlns:p="http://schemas.openxmlformats.org/presentationml/2006/main">
   <p:cSld>
     <p:spTree>
@@ -5405,292 +3307,60 @@
       </p:grpSpPr>
       <p:sp>
         <p:nvSpPr>
-          <p:cNvPr id="3" name="Marcador de texto 2">
-            <a:extLst>
-              <a:ext uri="{FF2B5EF4-FFF2-40B4-BE49-F238E27FC236}">
-                <a16:creationId xmlns:a16="http://schemas.microsoft.com/office/drawing/2014/main" id="{F56006E0-0046-8535-DA2E-60C0BDC34BBB}"/>
-              </a:ext>
-            </a:extLst>
-          </p:cNvPr>
+          <p:cNvPr id="139" name="GRACIAS"/>
           <p:cNvSpPr>
             <a:spLocks noGrp="1"/>
           </p:cNvSpPr>
           <p:nvPr>
-            <p:ph type="body" sz="quarter" idx="14"/>
+            <p:ph type="body" idx="13"/>
           </p:nvPr>
         </p:nvSpPr>
         <p:spPr>
           <a:xfrm>
-            <a:off x="738937" y="763335"/>
-            <a:ext cx="20033846" cy="1721448"/>
-          </a:xfrm>
-        </p:spPr>
-        <p:txBody>
-          <a:bodyPr>
-            <a:normAutofit fontScale="77500" lnSpcReduction="20000"/>
-          </a:bodyPr>
-          <a:lstStyle/>
-          <a:p>
-            <a:r>
-              <a:rPr lang="es-CR" dirty="0">
-                <a:effectLst>
-                  <a:outerShdw blurRad="38100" dist="38100" dir="2700000" algn="tl">
-                    <a:srgbClr val="000000">
-                      <a:alpha val="43137"/>
-                    </a:srgbClr>
-                  </a:outerShdw>
-                </a:effectLst>
-              </a:rPr>
-              <a:t>Corremos el App en el emulador de Android</a:t>
-            </a:r>
-          </a:p>
-        </p:txBody>
-      </p:sp>
-      <p:pic>
-        <p:nvPicPr>
-          <p:cNvPr id="5" name="Imagen 4">
-            <a:extLst>
-              <a:ext uri="{FF2B5EF4-FFF2-40B4-BE49-F238E27FC236}">
-                <a16:creationId xmlns:a16="http://schemas.microsoft.com/office/drawing/2014/main" id="{EF7A89B4-A20E-3F60-576E-31349173C32A}"/>
-              </a:ext>
-            </a:extLst>
-          </p:cNvPr>
-          <p:cNvPicPr>
-            <a:picLocks noChangeAspect="1"/>
-          </p:cNvPicPr>
-          <p:nvPr/>
-        </p:nvPicPr>
-        <p:blipFill>
-          <a:blip r:embed="rId2"/>
-          <a:stretch>
-            <a:fillRect/>
-          </a:stretch>
-        </p:blipFill>
-        <p:spPr>
-          <a:xfrm>
-            <a:off x="4514436" y="3052699"/>
-            <a:ext cx="5462692" cy="10458487"/>
+            <a:off x="15276812" y="6261100"/>
+            <a:ext cx="6971837" cy="2203252"/>
           </a:xfrm>
           <a:prstGeom prst="rect">
             <a:avLst/>
           </a:prstGeom>
         </p:spPr>
-      </p:pic>
-      <p:pic>
-        <p:nvPicPr>
-          <p:cNvPr id="7" name="Imagen 6">
-            <a:extLst>
-              <a:ext uri="{FF2B5EF4-FFF2-40B4-BE49-F238E27FC236}">
-                <a16:creationId xmlns:a16="http://schemas.microsoft.com/office/drawing/2014/main" id="{75CEDE5E-61FF-5386-C2A4-42E7F766C39E}"/>
-              </a:ext>
-            </a:extLst>
-          </p:cNvPr>
-          <p:cNvPicPr>
-            <a:picLocks noChangeAspect="1"/>
-          </p:cNvPicPr>
-          <p:nvPr/>
-        </p:nvPicPr>
-        <p:blipFill>
-          <a:blip r:embed="rId3"/>
-          <a:stretch>
-            <a:fillRect/>
-          </a:stretch>
-        </p:blipFill>
+        <p:txBody>
+          <a:bodyPr/>
+          <a:lstStyle/>
+          <a:p>
+            <a:r>
+              <a:rPr dirty="0"/>
+              <a:t>GRACIAS</a:t>
+            </a:r>
+          </a:p>
+        </p:txBody>
+      </p:sp>
+      <p:sp>
+        <p:nvSpPr>
+          <p:cNvPr id="140" name="MUCHAS"/>
+          <p:cNvSpPr>
+            <a:spLocks noGrp="1"/>
+          </p:cNvSpPr>
+          <p:nvPr>
+            <p:ph type="body" idx="14"/>
+          </p:nvPr>
+        </p:nvSpPr>
         <p:spPr>
-          <a:xfrm>
-            <a:off x="13751054" y="3052698"/>
-            <a:ext cx="5464266" cy="10458488"/>
-          </a:xfrm>
           <a:prstGeom prst="rect">
             <a:avLst/>
           </a:prstGeom>
         </p:spPr>
-      </p:pic>
-    </p:spTree>
-    <p:extLst>
-      <p:ext uri="{BB962C8B-B14F-4D97-AF65-F5344CB8AC3E}">
-        <p14:creationId xmlns:p14="http://schemas.microsoft.com/office/powerpoint/2010/main" val="665486350"/>
-      </p:ext>
-    </p:extLst>
-  </p:cSld>
-  <p:clrMapOvr>
-    <a:masterClrMapping/>
-  </p:clrMapOvr>
-  <p:transition spd="med"/>
-</p:sld>
-</file>
-
-<file path=ppt/slides/slide8.xml><?xml version="1.0" encoding="utf-8"?>
-<p:sld xmlns:a="http://schemas.openxmlformats.org/drawingml/2006/main" xmlns:r="http://schemas.openxmlformats.org/officeDocument/2006/relationships" xmlns:p="http://schemas.openxmlformats.org/presentationml/2006/main">
-  <p:cSld>
-    <p:spTree>
-      <p:nvGrpSpPr>
-        <p:cNvPr id="1" name=""/>
-        <p:cNvGrpSpPr/>
-        <p:nvPr/>
-      </p:nvGrpSpPr>
-      <p:grpSpPr>
-        <a:xfrm>
-          <a:off x="0" y="0"/>
-          <a:ext cx="0" cy="0"/>
-          <a:chOff x="0" y="0"/>
-          <a:chExt cx="0" cy="0"/>
-        </a:xfrm>
-      </p:grpSpPr>
-      <p:sp>
-        <p:nvSpPr>
-          <p:cNvPr id="3" name="Marcador de texto 2">
-            <a:extLst>
-              <a:ext uri="{FF2B5EF4-FFF2-40B4-BE49-F238E27FC236}">
-                <a16:creationId xmlns:a16="http://schemas.microsoft.com/office/drawing/2014/main" id="{2716B7AD-09D5-2A8B-E65D-55F030BD46B8}"/>
-              </a:ext>
-            </a:extLst>
-          </p:cNvPr>
-          <p:cNvSpPr>
-            <a:spLocks noGrp="1"/>
-          </p:cNvSpPr>
-          <p:nvPr>
-            <p:ph type="body" sz="quarter" idx="14"/>
-          </p:nvPr>
-        </p:nvSpPr>
-        <p:spPr>
-          <a:xfrm>
-            <a:off x="2953808" y="5213442"/>
-            <a:ext cx="18476383" cy="2203252"/>
-          </a:xfrm>
-        </p:spPr>
         <p:txBody>
-          <a:bodyPr>
-            <a:normAutofit fontScale="85000" lnSpcReduction="10000"/>
-          </a:bodyPr>
+          <a:bodyPr/>
           <a:lstStyle/>
           <a:p>
-            <a:pPr algn="ctr"/>
             <a:r>
-              <a:rPr lang="es-CR" dirty="0">
-                <a:effectLst>
-                  <a:outerShdw blurRad="38100" dist="38100" dir="2700000" algn="tl">
-                    <a:srgbClr val="000000">
-                      <a:alpha val="43137"/>
-                    </a:srgbClr>
-                  </a:outerShdw>
-                </a:effectLst>
-              </a:rPr>
-              <a:t>Inspeccionemos un poco el proyecto</a:t>
+              <a:t>MUCHAS</a:t>
             </a:r>
           </a:p>
         </p:txBody>
       </p:sp>
     </p:spTree>
-    <p:extLst>
-      <p:ext uri="{BB962C8B-B14F-4D97-AF65-F5344CB8AC3E}">
-        <p14:creationId xmlns:p14="http://schemas.microsoft.com/office/powerpoint/2010/main" val="571164297"/>
-      </p:ext>
-    </p:extLst>
-  </p:cSld>
-  <p:clrMapOvr>
-    <a:masterClrMapping/>
-  </p:clrMapOvr>
-  <p:transition spd="med"/>
-</p:sld>
-</file>
-
-<file path=ppt/slides/slide9.xml><?xml version="1.0" encoding="utf-8"?>
-<p:sld xmlns:a="http://schemas.openxmlformats.org/drawingml/2006/main" xmlns:r="http://schemas.openxmlformats.org/officeDocument/2006/relationships" xmlns:p="http://schemas.openxmlformats.org/presentationml/2006/main">
-  <p:cSld>
-    <p:spTree>
-      <p:nvGrpSpPr>
-        <p:cNvPr id="1" name=""/>
-        <p:cNvGrpSpPr/>
-        <p:nvPr/>
-      </p:nvGrpSpPr>
-      <p:grpSpPr>
-        <a:xfrm>
-          <a:off x="0" y="0"/>
-          <a:ext cx="0" cy="0"/>
-          <a:chOff x="0" y="0"/>
-          <a:chExt cx="0" cy="0"/>
-        </a:xfrm>
-      </p:grpSpPr>
-      <p:sp>
-        <p:nvSpPr>
-          <p:cNvPr id="3" name="Marcador de texto 2">
-            <a:extLst>
-              <a:ext uri="{FF2B5EF4-FFF2-40B4-BE49-F238E27FC236}">
-                <a16:creationId xmlns:a16="http://schemas.microsoft.com/office/drawing/2014/main" id="{11D6998A-AC69-6E81-D91B-8F86FA56C891}"/>
-              </a:ext>
-            </a:extLst>
-          </p:cNvPr>
-          <p:cNvSpPr>
-            <a:spLocks noGrp="1"/>
-          </p:cNvSpPr>
-          <p:nvPr>
-            <p:ph type="body" sz="quarter" idx="14"/>
-          </p:nvPr>
-        </p:nvSpPr>
-        <p:spPr>
-          <a:xfrm>
-            <a:off x="768500" y="740728"/>
-            <a:ext cx="19444631" cy="1317848"/>
-          </a:xfrm>
-        </p:spPr>
-        <p:txBody>
-          <a:bodyPr>
-            <a:normAutofit fontScale="70000" lnSpcReduction="20000"/>
-          </a:bodyPr>
-          <a:lstStyle/>
-          <a:p>
-            <a:r>
-              <a:rPr lang="es-CR" dirty="0">
-                <a:effectLst>
-                  <a:outerShdw blurRad="38100" dist="38100" dir="2700000" algn="tl">
-                    <a:srgbClr val="000000">
-                      <a:alpha val="43137"/>
-                    </a:srgbClr>
-                  </a:outerShdw>
-                </a:effectLst>
-              </a:rPr>
-              <a:t>Todas las plataformas apuntan a la misma clase</a:t>
-            </a:r>
-          </a:p>
-        </p:txBody>
-      </p:sp>
-      <p:pic>
-        <p:nvPicPr>
-          <p:cNvPr id="7" name="Imagen 6">
-            <a:extLst>
-              <a:ext uri="{FF2B5EF4-FFF2-40B4-BE49-F238E27FC236}">
-                <a16:creationId xmlns:a16="http://schemas.microsoft.com/office/drawing/2014/main" id="{B8708732-91BC-3C6C-497C-017FB5B0B942}"/>
-              </a:ext>
-            </a:extLst>
-          </p:cNvPr>
-          <p:cNvPicPr>
-            <a:picLocks noChangeAspect="1"/>
-          </p:cNvPicPr>
-          <p:nvPr/>
-        </p:nvPicPr>
-        <p:blipFill>
-          <a:blip r:embed="rId2"/>
-          <a:stretch>
-            <a:fillRect/>
-          </a:stretch>
-        </p:blipFill>
-        <p:spPr>
-          <a:xfrm>
-            <a:off x="3099226" y="3032256"/>
-            <a:ext cx="18185548" cy="9945632"/>
-          </a:xfrm>
-          <a:prstGeom prst="rect">
-            <a:avLst/>
-          </a:prstGeom>
-        </p:spPr>
-      </p:pic>
-    </p:spTree>
-    <p:extLst>
-      <p:ext uri="{BB962C8B-B14F-4D97-AF65-F5344CB8AC3E}">
-        <p14:creationId xmlns:p14="http://schemas.microsoft.com/office/powerpoint/2010/main" val="3472527179"/>
-      </p:ext>
-    </p:extLst>
   </p:cSld>
   <p:clrMapOvr>
     <a:masterClrMapping/>

</xml_diff>